<commit_message>
Remove unneded slides from the end of the presentation.
</commit_message>
<xml_diff>
--- a/trailer/Trailer.pptx
+++ b/trailer/Trailer.pptx
@@ -5,39 +5,30 @@
     <p:sldMasterId id="2147483648" r:id="rId1"/>
   </p:sldMasterIdLst>
   <p:notesMasterIdLst>
-    <p:notesMasterId r:id="rId15"/>
+    <p:notesMasterId r:id="rId6"/>
   </p:notesMasterIdLst>
   <p:sldIdLst>
     <p:sldId id="266" r:id="rId2"/>
     <p:sldId id="269" r:id="rId3"/>
     <p:sldId id="267" r:id="rId4"/>
     <p:sldId id="268" r:id="rId5"/>
-    <p:sldId id="256" r:id="rId6"/>
-    <p:sldId id="257" r:id="rId7"/>
-    <p:sldId id="258" r:id="rId8"/>
-    <p:sldId id="260" r:id="rId9"/>
-    <p:sldId id="261" r:id="rId10"/>
-    <p:sldId id="262" r:id="rId11"/>
-    <p:sldId id="263" r:id="rId12"/>
-    <p:sldId id="264" r:id="rId13"/>
-    <p:sldId id="265" r:id="rId14"/>
   </p:sldIdLst>
   <p:sldSz cx="12192000" cy="6858000"/>
   <p:notesSz cx="6858000" cy="9144000"/>
   <p:embeddedFontLst>
     <p:embeddedFont>
       <p:font typeface="Calibri" panose="020F0502020204030204" pitchFamily="34" charset="0"/>
-      <p:regular r:id="rId16"/>
-      <p:bold r:id="rId17"/>
-      <p:italic r:id="rId18"/>
-      <p:boldItalic r:id="rId19"/>
+      <p:regular r:id="rId7"/>
+      <p:bold r:id="rId8"/>
+      <p:italic r:id="rId9"/>
+      <p:boldItalic r:id="rId10"/>
     </p:embeddedFont>
     <p:embeddedFont>
       <p:font typeface="Tw Cen MT" panose="020B0602020104020603" pitchFamily="34" charset="77"/>
-      <p:regular r:id="rId20"/>
-      <p:bold r:id="rId21"/>
-      <p:italic r:id="rId22"/>
-      <p:boldItalic r:id="rId23"/>
+      <p:regular r:id="rId11"/>
+      <p:bold r:id="rId12"/>
+      <p:italic r:id="rId13"/>
+      <p:boldItalic r:id="rId14"/>
     </p:embeddedFont>
   </p:embeddedFontLst>
   <p:defaultTextStyle>
@@ -135,6 +126,11 @@
       </a:defRPr>
     </a:lvl9pPr>
   </p:defaultTextStyle>
+  <p:extLst>
+    <p:ext uri="{EFAFB233-063F-42B5-8137-9DF3F51BA10A}">
+      <p15:sldGuideLst xmlns:p15="http://schemas.microsoft.com/office/powerpoint/2012/main"/>
+    </p:ext>
+  </p:extLst>
 </p:presentation>
 </file>
 
@@ -743,7 +739,7 @@
           <a:p>
             <a:fld id="{48A87A34-81AB-432B-8DAE-1953F412C126}" type="datetimeFigureOut">
               <a:rPr lang="en-US"/>
-              <a:t>1/3/22</a:t>
+              <a:t>1/4/22</a:t>
             </a:fld>
             <a:endParaRPr lang="en-US" dirty="0"/>
           </a:p>
@@ -796,13 +792,13 @@
   <p:clrMapOvr>
     <a:masterClrMapping/>
   </p:clrMapOvr>
-  <mc:AlternateContent xmlns:mc="http://schemas.openxmlformats.org/markup-compatibility/2006">
-    <mc:Choice xmlns:p14="http://schemas.microsoft.com/office/powerpoint/2010/main" Requires="p14">
+  <mc:AlternateContent xmlns:mc="http://schemas.openxmlformats.org/markup-compatibility/2006" xmlns:p14="http://schemas.microsoft.com/office/powerpoint/2010/main">
+    <mc:Choice Requires="p14">
       <p:transition spd="slow" p14:dur="1600">
         <p14:conveyor dir="l"/>
       </p:transition>
     </mc:Choice>
-    <mc:Fallback>
+    <mc:Fallback xmlns="">
       <p:transition spd="slow">
         <p:fade/>
       </p:transition>
@@ -1062,7 +1058,7 @@
           <a:p>
             <a:fld id="{48A87A34-81AB-432B-8DAE-1953F412C126}" type="datetimeFigureOut">
               <a:rPr lang="en-US"/>
-              <a:t>1/3/22</a:t>
+              <a:t>1/4/22</a:t>
             </a:fld>
             <a:endParaRPr lang="en-US" dirty="0"/>
           </a:p>
@@ -1115,13 +1111,13 @@
   <p:clrMapOvr>
     <a:masterClrMapping/>
   </p:clrMapOvr>
-  <mc:AlternateContent xmlns:mc="http://schemas.openxmlformats.org/markup-compatibility/2006">
-    <mc:Choice xmlns:p14="http://schemas.microsoft.com/office/powerpoint/2010/main" Requires="p14">
+  <mc:AlternateContent xmlns:mc="http://schemas.openxmlformats.org/markup-compatibility/2006" xmlns:p14="http://schemas.microsoft.com/office/powerpoint/2010/main">
+    <mc:Choice Requires="p14">
       <p:transition spd="slow" p14:dur="1600">
         <p14:conveyor dir="l"/>
       </p:transition>
     </mc:Choice>
-    <mc:Fallback>
+    <mc:Fallback xmlns="">
       <p:transition spd="slow">
         <p:fade/>
       </p:transition>
@@ -1291,7 +1287,7 @@
           <a:p>
             <a:fld id="{48A87A34-81AB-432B-8DAE-1953F412C126}" type="datetimeFigureOut">
               <a:rPr lang="en-US"/>
-              <a:t>1/3/22</a:t>
+              <a:t>1/4/22</a:t>
             </a:fld>
             <a:endParaRPr lang="en-US" dirty="0"/>
           </a:p>
@@ -1344,13 +1340,13 @@
   <p:clrMapOvr>
     <a:masterClrMapping/>
   </p:clrMapOvr>
-  <mc:AlternateContent xmlns:mc="http://schemas.openxmlformats.org/markup-compatibility/2006">
-    <mc:Choice xmlns:p14="http://schemas.microsoft.com/office/powerpoint/2010/main" Requires="p14">
+  <mc:AlternateContent xmlns:mc="http://schemas.openxmlformats.org/markup-compatibility/2006" xmlns:p14="http://schemas.microsoft.com/office/powerpoint/2010/main">
+    <mc:Choice Requires="p14">
       <p:transition spd="slow" p14:dur="1600">
         <p14:conveyor dir="l"/>
       </p:transition>
     </mc:Choice>
-    <mc:Fallback>
+    <mc:Fallback xmlns="">
       <p:transition spd="slow">
         <p:fade/>
       </p:transition>
@@ -1589,7 +1585,7 @@
           <a:p>
             <a:fld id="{48A87A34-81AB-432B-8DAE-1953F412C126}" type="datetimeFigureOut">
               <a:rPr lang="en-US"/>
-              <a:t>1/3/22</a:t>
+              <a:t>1/4/22</a:t>
             </a:fld>
             <a:endParaRPr lang="en-US" dirty="0"/>
           </a:p>
@@ -1874,13 +1870,13 @@
   <p:clrMapOvr>
     <a:masterClrMapping/>
   </p:clrMapOvr>
-  <mc:AlternateContent xmlns:mc="http://schemas.openxmlformats.org/markup-compatibility/2006">
-    <mc:Choice xmlns:p14="http://schemas.microsoft.com/office/powerpoint/2010/main" Requires="p14">
+  <mc:AlternateContent xmlns:mc="http://schemas.openxmlformats.org/markup-compatibility/2006" xmlns:p14="http://schemas.microsoft.com/office/powerpoint/2010/main">
+    <mc:Choice Requires="p14">
       <p:transition spd="slow" p14:dur="1600">
         <p14:conveyor dir="l"/>
       </p:transition>
     </mc:Choice>
-    <mc:Fallback>
+    <mc:Fallback xmlns="">
       <p:transition spd="slow">
         <p:fade/>
       </p:transition>
@@ -2050,7 +2046,7 @@
           <a:p>
             <a:fld id="{48A87A34-81AB-432B-8DAE-1953F412C126}" type="datetimeFigureOut">
               <a:rPr lang="en-US"/>
-              <a:t>1/3/22</a:t>
+              <a:t>1/4/22</a:t>
             </a:fld>
             <a:endParaRPr lang="en-US" dirty="0"/>
           </a:p>
@@ -2103,13 +2099,13 @@
   <p:clrMapOvr>
     <a:masterClrMapping/>
   </p:clrMapOvr>
-  <mc:AlternateContent xmlns:mc="http://schemas.openxmlformats.org/markup-compatibility/2006">
-    <mc:Choice xmlns:p14="http://schemas.microsoft.com/office/powerpoint/2010/main" Requires="p14">
+  <mc:AlternateContent xmlns:mc="http://schemas.openxmlformats.org/markup-compatibility/2006" xmlns:p14="http://schemas.microsoft.com/office/powerpoint/2010/main">
+    <mc:Choice Requires="p14">
       <p:transition spd="slow" p14:dur="1600">
         <p14:conveyor dir="l"/>
       </p:transition>
     </mc:Choice>
-    <mc:Fallback>
+    <mc:Fallback xmlns="">
       <p:transition spd="slow">
         <p:fade/>
       </p:transition>
@@ -2633,7 +2629,7 @@
           <a:p>
             <a:fld id="{48A87A34-81AB-432B-8DAE-1953F412C126}" type="datetimeFigureOut">
               <a:rPr lang="en-US"/>
-              <a:t>1/3/22</a:t>
+              <a:t>1/4/22</a:t>
             </a:fld>
             <a:endParaRPr lang="en-US" dirty="0"/>
           </a:p>
@@ -2686,13 +2682,13 @@
   <p:clrMapOvr>
     <a:masterClrMapping/>
   </p:clrMapOvr>
-  <mc:AlternateContent xmlns:mc="http://schemas.openxmlformats.org/markup-compatibility/2006">
-    <mc:Choice xmlns:p14="http://schemas.microsoft.com/office/powerpoint/2010/main" Requires="p14">
+  <mc:AlternateContent xmlns:mc="http://schemas.openxmlformats.org/markup-compatibility/2006" xmlns:p14="http://schemas.microsoft.com/office/powerpoint/2010/main">
+    <mc:Choice Requires="p14">
       <p:transition spd="slow" p14:dur="1600">
         <p14:conveyor dir="l"/>
       </p:transition>
     </mc:Choice>
-    <mc:Fallback>
+    <mc:Fallback xmlns="">
       <p:transition spd="slow">
         <p:fade/>
       </p:transition>
@@ -3492,7 +3488,7 @@
           <a:p>
             <a:fld id="{48A87A34-81AB-432B-8DAE-1953F412C126}" type="datetimeFigureOut">
               <a:rPr lang="en-US"/>
-              <a:t>1/3/22</a:t>
+              <a:t>1/4/22</a:t>
             </a:fld>
             <a:endParaRPr lang="en-US" dirty="0"/>
           </a:p>
@@ -3545,13 +3541,13 @@
   <p:clrMapOvr>
     <a:masterClrMapping/>
   </p:clrMapOvr>
-  <mc:AlternateContent xmlns:mc="http://schemas.openxmlformats.org/markup-compatibility/2006">
-    <mc:Choice xmlns:p14="http://schemas.microsoft.com/office/powerpoint/2010/main" Requires="p14">
+  <mc:AlternateContent xmlns:mc="http://schemas.openxmlformats.org/markup-compatibility/2006" xmlns:p14="http://schemas.microsoft.com/office/powerpoint/2010/main">
+    <mc:Choice Requires="p14">
       <p:transition spd="slow" p14:dur="1600">
         <p14:conveyor dir="l"/>
       </p:transition>
     </mc:Choice>
-    <mc:Fallback>
+    <mc:Fallback xmlns="">
       <p:transition spd="slow">
         <p:fade/>
       </p:transition>
@@ -3704,7 +3700,7 @@
           <a:p>
             <a:fld id="{48A87A34-81AB-432B-8DAE-1953F412C126}" type="datetimeFigureOut">
               <a:rPr lang="en-US"/>
-              <a:t>1/3/22</a:t>
+              <a:t>1/4/22</a:t>
             </a:fld>
             <a:endParaRPr lang="en-US" dirty="0"/>
           </a:p>
@@ -3757,13 +3753,13 @@
   <p:clrMapOvr>
     <a:masterClrMapping/>
   </p:clrMapOvr>
-  <mc:AlternateContent xmlns:mc="http://schemas.openxmlformats.org/markup-compatibility/2006">
-    <mc:Choice xmlns:p14="http://schemas.microsoft.com/office/powerpoint/2010/main" Requires="p14">
+  <mc:AlternateContent xmlns:mc="http://schemas.openxmlformats.org/markup-compatibility/2006" xmlns:p14="http://schemas.microsoft.com/office/powerpoint/2010/main">
+    <mc:Choice Requires="p14">
       <p:transition spd="slow" p14:dur="1600">
         <p14:conveyor dir="l"/>
       </p:transition>
     </mc:Choice>
-    <mc:Fallback>
+    <mc:Fallback xmlns="">
       <p:transition spd="slow">
         <p:fade/>
       </p:transition>
@@ -3925,7 +3921,7 @@
           <a:p>
             <a:fld id="{48A87A34-81AB-432B-8DAE-1953F412C126}" type="datetimeFigureOut">
               <a:rPr lang="en-US"/>
-              <a:t>1/3/22</a:t>
+              <a:t>1/4/22</a:t>
             </a:fld>
             <a:endParaRPr lang="en-US" dirty="0"/>
           </a:p>
@@ -3978,13 +3974,13 @@
   <p:clrMapOvr>
     <a:masterClrMapping/>
   </p:clrMapOvr>
-  <mc:AlternateContent xmlns:mc="http://schemas.openxmlformats.org/markup-compatibility/2006">
-    <mc:Choice xmlns:p14="http://schemas.microsoft.com/office/powerpoint/2010/main" Requires="p14">
+  <mc:AlternateContent xmlns:mc="http://schemas.openxmlformats.org/markup-compatibility/2006" xmlns:p14="http://schemas.microsoft.com/office/powerpoint/2010/main">
+    <mc:Choice Requires="p14">
       <p:transition spd="slow" p14:dur="1600">
         <p14:conveyor dir="l"/>
       </p:transition>
     </mc:Choice>
-    <mc:Fallback>
+    <mc:Fallback xmlns="">
       <p:transition spd="slow">
         <p:fade/>
       </p:transition>
@@ -4137,7 +4133,7 @@
           <a:p>
             <a:fld id="{48A87A34-81AB-432B-8DAE-1953F412C126}" type="datetimeFigureOut">
               <a:rPr lang="en-US"/>
-              <a:t>1/3/22</a:t>
+              <a:t>1/4/22</a:t>
             </a:fld>
             <a:endParaRPr lang="en-US" dirty="0"/>
           </a:p>
@@ -4190,13 +4186,13 @@
   <p:clrMapOvr>
     <a:masterClrMapping/>
   </p:clrMapOvr>
-  <mc:AlternateContent xmlns:mc="http://schemas.openxmlformats.org/markup-compatibility/2006">
-    <mc:Choice xmlns:p14="http://schemas.microsoft.com/office/powerpoint/2010/main" Requires="p14">
+  <mc:AlternateContent xmlns:mc="http://schemas.openxmlformats.org/markup-compatibility/2006" xmlns:p14="http://schemas.microsoft.com/office/powerpoint/2010/main">
+    <mc:Choice Requires="p14">
       <p:transition spd="slow" p14:dur="1600">
         <p14:conveyor dir="l"/>
       </p:transition>
     </mc:Choice>
-    <mc:Fallback>
+    <mc:Fallback xmlns="">
       <p:transition spd="slow">
         <p:fade/>
       </p:transition>
@@ -4424,7 +4420,7 @@
           <a:p>
             <a:fld id="{48A87A34-81AB-432B-8DAE-1953F412C126}" type="datetimeFigureOut">
               <a:rPr lang="en-US"/>
-              <a:t>1/3/22</a:t>
+              <a:t>1/4/22</a:t>
             </a:fld>
             <a:endParaRPr lang="en-US" dirty="0"/>
           </a:p>
@@ -4477,13 +4473,13 @@
   <p:clrMapOvr>
     <a:masterClrMapping/>
   </p:clrMapOvr>
-  <mc:AlternateContent xmlns:mc="http://schemas.openxmlformats.org/markup-compatibility/2006">
-    <mc:Choice xmlns:p14="http://schemas.microsoft.com/office/powerpoint/2010/main" Requires="p14">
+  <mc:AlternateContent xmlns:mc="http://schemas.openxmlformats.org/markup-compatibility/2006" xmlns:p14="http://schemas.microsoft.com/office/powerpoint/2010/main">
+    <mc:Choice Requires="p14">
       <p:transition spd="slow" p14:dur="1600">
         <p14:conveyor dir="l"/>
       </p:transition>
     </mc:Choice>
-    <mc:Fallback>
+    <mc:Fallback xmlns="">
       <p:transition spd="slow">
         <p:fade/>
       </p:transition>
@@ -4698,7 +4694,7 @@
           <a:p>
             <a:fld id="{48A87A34-81AB-432B-8DAE-1953F412C126}" type="datetimeFigureOut">
               <a:rPr lang="en-US"/>
-              <a:t>1/3/22</a:t>
+              <a:t>1/4/22</a:t>
             </a:fld>
             <a:endParaRPr lang="en-US" dirty="0"/>
           </a:p>
@@ -4751,13 +4747,13 @@
   <p:clrMapOvr>
     <a:masterClrMapping/>
   </p:clrMapOvr>
-  <mc:AlternateContent xmlns:mc="http://schemas.openxmlformats.org/markup-compatibility/2006">
-    <mc:Choice xmlns:p14="http://schemas.microsoft.com/office/powerpoint/2010/main" Requires="p14">
+  <mc:AlternateContent xmlns:mc="http://schemas.openxmlformats.org/markup-compatibility/2006" xmlns:p14="http://schemas.microsoft.com/office/powerpoint/2010/main">
+    <mc:Choice Requires="p14">
       <p:transition spd="slow" p14:dur="1600">
         <p14:conveyor dir="l"/>
       </p:transition>
     </mc:Choice>
-    <mc:Fallback>
+    <mc:Fallback xmlns="">
       <p:transition spd="slow">
         <p:fade/>
       </p:transition>
@@ -5120,7 +5116,7 @@
           <a:p>
             <a:fld id="{48A87A34-81AB-432B-8DAE-1953F412C126}" type="datetimeFigureOut">
               <a:rPr lang="en-US"/>
-              <a:t>1/3/22</a:t>
+              <a:t>1/4/22</a:t>
             </a:fld>
             <a:endParaRPr lang="en-US" dirty="0"/>
           </a:p>
@@ -5173,13 +5169,13 @@
   <p:clrMapOvr>
     <a:masterClrMapping/>
   </p:clrMapOvr>
-  <mc:AlternateContent xmlns:mc="http://schemas.openxmlformats.org/markup-compatibility/2006">
-    <mc:Choice xmlns:p14="http://schemas.microsoft.com/office/powerpoint/2010/main" Requires="p14">
+  <mc:AlternateContent xmlns:mc="http://schemas.openxmlformats.org/markup-compatibility/2006" xmlns:p14="http://schemas.microsoft.com/office/powerpoint/2010/main">
+    <mc:Choice Requires="p14">
       <p:transition spd="slow" p14:dur="1600">
         <p14:conveyor dir="l"/>
       </p:transition>
     </mc:Choice>
-    <mc:Fallback>
+    <mc:Fallback xmlns="">
       <p:transition spd="slow">
         <p:fade/>
       </p:transition>
@@ -5275,7 +5271,7 @@
           <a:p>
             <a:fld id="{48A87A34-81AB-432B-8DAE-1953F412C126}" type="datetimeFigureOut">
               <a:rPr lang="en-US"/>
-              <a:t>1/3/22</a:t>
+              <a:t>1/4/22</a:t>
             </a:fld>
             <a:endParaRPr lang="en-US" dirty="0"/>
           </a:p>
@@ -5328,13 +5324,13 @@
   <p:clrMapOvr>
     <a:masterClrMapping/>
   </p:clrMapOvr>
-  <mc:AlternateContent xmlns:mc="http://schemas.openxmlformats.org/markup-compatibility/2006">
-    <mc:Choice xmlns:p14="http://schemas.microsoft.com/office/powerpoint/2010/main" Requires="p14">
+  <mc:AlternateContent xmlns:mc="http://schemas.openxmlformats.org/markup-compatibility/2006" xmlns:p14="http://schemas.microsoft.com/office/powerpoint/2010/main">
+    <mc:Choice Requires="p14">
       <p:transition spd="slow" p14:dur="1600">
         <p14:conveyor dir="l"/>
       </p:transition>
     </mc:Choice>
-    <mc:Fallback>
+    <mc:Fallback xmlns="">
       <p:transition spd="slow">
         <p:fade/>
       </p:transition>
@@ -5407,7 +5403,7 @@
           <a:p>
             <a:fld id="{48A87A34-81AB-432B-8DAE-1953F412C126}" type="datetimeFigureOut">
               <a:rPr lang="en-US"/>
-              <a:t>1/3/22</a:t>
+              <a:t>1/4/22</a:t>
             </a:fld>
             <a:endParaRPr lang="en-US" dirty="0"/>
           </a:p>
@@ -5460,13 +5456,13 @@
   <p:clrMapOvr>
     <a:masterClrMapping/>
   </p:clrMapOvr>
-  <mc:AlternateContent xmlns:mc="http://schemas.openxmlformats.org/markup-compatibility/2006">
-    <mc:Choice xmlns:p14="http://schemas.microsoft.com/office/powerpoint/2010/main" Requires="p14">
+  <mc:AlternateContent xmlns:mc="http://schemas.openxmlformats.org/markup-compatibility/2006" xmlns:p14="http://schemas.microsoft.com/office/powerpoint/2010/main">
+    <mc:Choice Requires="p14">
       <p:transition spd="slow" p14:dur="1600">
         <p14:conveyor dir="l"/>
       </p:transition>
     </mc:Choice>
-    <mc:Fallback>
+    <mc:Fallback xmlns="">
       <p:transition spd="slow">
         <p:fade/>
       </p:transition>
@@ -5693,7 +5689,7 @@
           <a:p>
             <a:fld id="{48A87A34-81AB-432B-8DAE-1953F412C126}" type="datetimeFigureOut">
               <a:rPr lang="en-US"/>
-              <a:t>1/3/22</a:t>
+              <a:t>1/4/22</a:t>
             </a:fld>
             <a:endParaRPr lang="en-US" dirty="0"/>
           </a:p>
@@ -5746,13 +5742,13 @@
   <p:clrMapOvr>
     <a:masterClrMapping/>
   </p:clrMapOvr>
-  <mc:AlternateContent xmlns:mc="http://schemas.openxmlformats.org/markup-compatibility/2006">
-    <mc:Choice xmlns:p14="http://schemas.microsoft.com/office/powerpoint/2010/main" Requires="p14">
+  <mc:AlternateContent xmlns:mc="http://schemas.openxmlformats.org/markup-compatibility/2006" xmlns:p14="http://schemas.microsoft.com/office/powerpoint/2010/main">
+    <mc:Choice Requires="p14">
       <p:transition spd="slow" p14:dur="1600">
         <p14:conveyor dir="l"/>
       </p:transition>
     </mc:Choice>
-    <mc:Fallback>
+    <mc:Fallback xmlns="">
       <p:transition spd="slow">
         <p:fade/>
       </p:transition>
@@ -6012,7 +6008,7 @@
           <a:p>
             <a:fld id="{48A87A34-81AB-432B-8DAE-1953F412C126}" type="datetimeFigureOut">
               <a:rPr lang="en-US"/>
-              <a:t>1/3/22</a:t>
+              <a:t>1/4/22</a:t>
             </a:fld>
             <a:endParaRPr lang="en-US" dirty="0"/>
           </a:p>
@@ -6065,13 +6061,13 @@
   <p:clrMapOvr>
     <a:masterClrMapping/>
   </p:clrMapOvr>
-  <mc:AlternateContent xmlns:mc="http://schemas.openxmlformats.org/markup-compatibility/2006">
-    <mc:Choice xmlns:p14="http://schemas.microsoft.com/office/powerpoint/2010/main" Requires="p14">
+  <mc:AlternateContent xmlns:mc="http://schemas.openxmlformats.org/markup-compatibility/2006" xmlns:p14="http://schemas.microsoft.com/office/powerpoint/2010/main">
+    <mc:Choice Requires="p14">
       <p:transition spd="slow" p14:dur="1600">
         <p14:conveyor dir="l"/>
       </p:transition>
     </mc:Choice>
-    <mc:Fallback>
+    <mc:Fallback xmlns="">
       <p:transition spd="slow">
         <p:fade/>
       </p:transition>
@@ -6273,7 +6269,7 @@
             <a:fld id="{48A87A34-81AB-432B-8DAE-1953F412C126}" type="datetimeFigureOut">
               <a:rPr lang="en-US"/>
               <a:pPr/>
-              <a:t>1/3/22</a:t>
+              <a:t>1/4/22</a:t>
             </a:fld>
             <a:endParaRPr lang="en-US" dirty="0"/>
           </a:p>
@@ -6376,13 +6372,13 @@
     <p:sldLayoutId id="2147483658" r:id="rId16"/>
     <p:sldLayoutId id="2147483659" r:id="rId17"/>
   </p:sldLayoutIdLst>
-  <mc:AlternateContent xmlns:mc="http://schemas.openxmlformats.org/markup-compatibility/2006">
-    <mc:Choice xmlns:p14="http://schemas.microsoft.com/office/powerpoint/2010/main" Requires="p14">
+  <mc:AlternateContent xmlns:mc="http://schemas.openxmlformats.org/markup-compatibility/2006" xmlns:p14="http://schemas.microsoft.com/office/powerpoint/2010/main">
+    <mc:Choice Requires="p14">
       <p:transition spd="slow" p14:dur="1600">
         <p14:conveyor dir="l"/>
       </p:transition>
     </mc:Choice>
-    <mc:Fallback>
+    <mc:Fallback xmlns="">
       <p:transition spd="slow">
         <p:fade/>
       </p:transition>
@@ -6940,1434 +6936,18 @@
   <p:clrMapOvr>
     <a:masterClrMapping/>
   </p:clrMapOvr>
-  <mc:AlternateContent xmlns:mc="http://schemas.openxmlformats.org/markup-compatibility/2006">
-    <mc:Choice xmlns:p14="http://schemas.microsoft.com/office/powerpoint/2010/main" Requires="p14">
+  <mc:AlternateContent xmlns:mc="http://schemas.openxmlformats.org/markup-compatibility/2006" xmlns:p14="http://schemas.microsoft.com/office/powerpoint/2010/main">
+    <mc:Choice Requires="p14">
       <p:transition spd="slow" p14:dur="1600">
         <p14:conveyor dir="l"/>
       </p:transition>
     </mc:Choice>
-    <mc:Fallback>
+    <mc:Fallback xmlns="">
       <p:transition spd="slow">
         <p:fade/>
       </p:transition>
     </mc:Fallback>
   </mc:AlternateContent>
-</p:sld>
-</file>
-
-<file path=ppt/slides/slide10.xml><?xml version="1.0" encoding="utf-8"?>
-<p:sld xmlns:a="http://schemas.openxmlformats.org/drawingml/2006/main" xmlns:r="http://schemas.openxmlformats.org/officeDocument/2006/relationships" xmlns:p="http://schemas.openxmlformats.org/presentationml/2006/main">
-  <p:cSld>
-    <p:bg>
-      <p:bgPr>
-        <a:gradFill rotWithShape="1">
-          <a:gsLst>
-            <a:gs pos="0">
-              <a:schemeClr val="bg1">
-                <a:tint val="90000"/>
-                <a:lumMod val="110000"/>
-              </a:schemeClr>
-            </a:gs>
-            <a:gs pos="100000">
-              <a:schemeClr val="bg1">
-                <a:shade val="64000"/>
-                <a:lumMod val="88000"/>
-              </a:schemeClr>
-            </a:gs>
-          </a:gsLst>
-          <a:lin ang="5400000" scaled="0"/>
-        </a:gradFill>
-        <a:effectLst/>
-      </p:bgPr>
-    </p:bg>
-    <p:spTree>
-      <p:nvGrpSpPr>
-        <p:cNvPr id="1" name=""/>
-        <p:cNvGrpSpPr/>
-        <p:nvPr/>
-      </p:nvGrpSpPr>
-      <p:grpSpPr>
-        <a:xfrm>
-          <a:off x="0" y="0"/>
-          <a:ext cx="0" cy="0"/>
-          <a:chOff x="0" y="0"/>
-          <a:chExt cx="0" cy="0"/>
-        </a:xfrm>
-      </p:grpSpPr>
-      <p:pic>
-        <p:nvPicPr>
-          <p:cNvPr id="7" name="Picture 2">
-            <a:extLst>
-              <a:ext uri="{FF2B5EF4-FFF2-40B4-BE49-F238E27FC236}">
-                <a16:creationId xmlns:a16="http://schemas.microsoft.com/office/drawing/2014/main" id="{9A0F0AC6-A89F-416B-9FA4-48E664065E73}"/>
-              </a:ext>
-              <a:ext uri="{C183D7F6-B498-43B3-948B-1728B52AA6E4}">
-                <adec:decorative xmlns:adec="http://schemas.microsoft.com/office/drawing/2017/decorative" val="1"/>
-              </a:ext>
-            </a:extLst>
-          </p:cNvPr>
-          <p:cNvPicPr>
-            <a:picLocks noGrp="1" noRot="1" noChangeAspect="1" noMove="1" noResize="1" noEditPoints="1" noAdjustHandles="1" noChangeArrowheads="1" noChangeShapeType="1" noCrop="1"/>
-          </p:cNvPicPr>
-          <p:nvPr>
-            <p:extLst>
-              <p:ext uri="{386F3935-93C4-4BCD-93E2-E3B085C9AB24}">
-                <p16:designElem xmlns:p16="http://schemas.microsoft.com/office/powerpoint/2015/main" val="1"/>
-              </p:ext>
-            </p:extLst>
-          </p:nvPr>
-        </p:nvPicPr>
-        <p:blipFill>
-          <a:blip r:embed="rId2">
-            <a:alphaModFix/>
-            <a:extLst>
-              <a:ext uri="{28A0092B-C50C-407E-A947-70E740481C1C}">
-                <a14:useLocalDpi xmlns:a14="http://schemas.microsoft.com/office/drawing/2010/main" val="0"/>
-              </a:ext>
-            </a:extLst>
-          </a:blip>
-          <a:srcRect/>
-          <a:stretch>
-            <a:fillRect/>
-          </a:stretch>
-        </p:blipFill>
-        <p:spPr bwMode="auto">
-          <a:xfrm>
-            <a:off x="0" y="-1"/>
-            <a:ext cx="12192003" cy="6858001"/>
-          </a:xfrm>
-          <a:prstGeom prst="rect">
-            <a:avLst/>
-          </a:prstGeom>
-          <a:noFill/>
-          <a:extLst>
-            <a:ext uri="{909E8E84-426E-40DD-AFC4-6F175D3DCCD1}">
-              <a14:hiddenFill xmlns:a14="http://schemas.microsoft.com/office/drawing/2010/main">
-                <a:solidFill>
-                  <a:srgbClr val="FFFFFF"/>
-                </a:solidFill>
-              </a14:hiddenFill>
-            </a:ext>
-          </a:extLst>
-        </p:spPr>
-      </p:pic>
-      <p:pic>
-        <p:nvPicPr>
-          <p:cNvPr id="9" name="Picture 8">
-            <a:extLst>
-              <a:ext uri="{FF2B5EF4-FFF2-40B4-BE49-F238E27FC236}">
-                <a16:creationId xmlns:a16="http://schemas.microsoft.com/office/drawing/2014/main" id="{C31AA009-40AD-4098-8AE7-680CA35C6EAA}"/>
-              </a:ext>
-              <a:ext uri="{C183D7F6-B498-43B3-948B-1728B52AA6E4}">
-                <adec:decorative xmlns:adec="http://schemas.microsoft.com/office/drawing/2017/decorative" val="1"/>
-              </a:ext>
-            </a:extLst>
-          </p:cNvPr>
-          <p:cNvPicPr>
-            <a:picLocks noGrp="1" noRot="1" noChangeAspect="1" noMove="1" noResize="1" noEditPoints="1" noAdjustHandles="1" noChangeArrowheads="1" noChangeShapeType="1" noCrop="1"/>
-          </p:cNvPicPr>
-          <p:nvPr>
-            <p:extLst>
-              <p:ext uri="{386F3935-93C4-4BCD-93E2-E3B085C9AB24}">
-                <p16:designElem xmlns:p16="http://schemas.microsoft.com/office/powerpoint/2015/main" val="1"/>
-              </p:ext>
-            </p:extLst>
-          </p:nvPr>
-        </p:nvPicPr>
-        <p:blipFill>
-          <a:blip r:embed="rId3">
-            <a:extLst>
-              <a:ext uri="{28A0092B-C50C-407E-A947-70E740481C1C}">
-                <a14:useLocalDpi xmlns:a14="http://schemas.microsoft.com/office/drawing/2010/main" val="0"/>
-              </a:ext>
-            </a:extLst>
-          </a:blip>
-          <a:stretch>
-            <a:fillRect/>
-          </a:stretch>
-        </p:blipFill>
-        <p:spPr>
-          <a:xfrm>
-            <a:off x="0" y="0"/>
-            <a:ext cx="12192000" cy="6858000"/>
-          </a:xfrm>
-          <a:prstGeom prst="rect">
-            <a:avLst/>
-          </a:prstGeom>
-        </p:spPr>
-      </p:pic>
-      <p:sp useBgFill="1">
-        <p:nvSpPr>
-          <p:cNvPr id="11" name="Rectangle 10">
-            <a:extLst>
-              <a:ext uri="{FF2B5EF4-FFF2-40B4-BE49-F238E27FC236}">
-                <a16:creationId xmlns:a16="http://schemas.microsoft.com/office/drawing/2014/main" id="{B63B6C0C-65BB-4F38-9C8A-0892266F8BC3}"/>
-              </a:ext>
-              <a:ext uri="{C183D7F6-B498-43B3-948B-1728B52AA6E4}">
-                <adec:decorative xmlns:adec="http://schemas.microsoft.com/office/drawing/2017/decorative" val="1"/>
-              </a:ext>
-            </a:extLst>
-          </p:cNvPr>
-          <p:cNvSpPr>
-            <a:spLocks noGrp="1" noRot="1" noChangeAspect="1" noMove="1" noResize="1" noEditPoints="1" noAdjustHandles="1" noChangeArrowheads="1" noChangeShapeType="1" noTextEdit="1"/>
-          </p:cNvSpPr>
-          <p:nvPr>
-            <p:extLst>
-              <p:ext uri="{386F3935-93C4-4BCD-93E2-E3B085C9AB24}">
-                <p16:designElem xmlns:p16="http://schemas.microsoft.com/office/powerpoint/2015/main" val="1"/>
-              </p:ext>
-            </p:extLst>
-          </p:nvPr>
-        </p:nvSpPr>
-        <p:spPr>
-          <a:xfrm>
-            <a:off x="0" y="0"/>
-            <a:ext cx="12192000" cy="6858000"/>
-          </a:xfrm>
-          <a:prstGeom prst="rect">
-            <a:avLst/>
-          </a:prstGeom>
-          <a:ln>
-            <a:noFill/>
-          </a:ln>
-        </p:spPr>
-        <p:style>
-          <a:lnRef idx="2">
-            <a:schemeClr val="accent1">
-              <a:shade val="50000"/>
-            </a:schemeClr>
-          </a:lnRef>
-          <a:fillRef idx="1">
-            <a:schemeClr val="accent1"/>
-          </a:fillRef>
-          <a:effectRef idx="0">
-            <a:schemeClr val="accent1"/>
-          </a:effectRef>
-          <a:fontRef idx="minor">
-            <a:schemeClr val="lt1"/>
-          </a:fontRef>
-        </p:style>
-        <p:txBody>
-          <a:bodyPr rtlCol="0" anchor="ctr"/>
-          <a:lstStyle/>
-          <a:p>
-            <a:pPr algn="ctr"/>
-            <a:endParaRPr lang="en-US" dirty="0"/>
-          </a:p>
-        </p:txBody>
-      </p:sp>
-      <p:pic>
-        <p:nvPicPr>
-          <p:cNvPr id="13" name="Picture 12">
-            <a:extLst>
-              <a:ext uri="{FF2B5EF4-FFF2-40B4-BE49-F238E27FC236}">
-                <a16:creationId xmlns:a16="http://schemas.microsoft.com/office/drawing/2014/main" id="{09D77137-01B7-45E4-AA14-CD9E779B443C}"/>
-              </a:ext>
-              <a:ext uri="{C183D7F6-B498-43B3-948B-1728B52AA6E4}">
-                <adec:decorative xmlns:adec="http://schemas.microsoft.com/office/drawing/2017/decorative" val="1"/>
-              </a:ext>
-            </a:extLst>
-          </p:cNvPr>
-          <p:cNvPicPr>
-            <a:picLocks noGrp="1" noRot="1" noChangeAspect="1" noMove="1" noResize="1" noEditPoints="1" noAdjustHandles="1" noChangeArrowheads="1" noChangeShapeType="1" noCrop="1"/>
-          </p:cNvPicPr>
-          <p:nvPr>
-            <p:extLst>
-              <p:ext uri="{386F3935-93C4-4BCD-93E2-E3B085C9AB24}">
-                <p16:designElem xmlns:p16="http://schemas.microsoft.com/office/powerpoint/2015/main" val="1"/>
-              </p:ext>
-            </p:extLst>
-          </p:nvPr>
-        </p:nvPicPr>
-        <p:blipFill>
-          <a:blip r:embed="rId3">
-            <a:extLst>
-              <a:ext uri="{28A0092B-C50C-407E-A947-70E740481C1C}">
-                <a14:useLocalDpi xmlns:a14="http://schemas.microsoft.com/office/drawing/2010/main" val="0"/>
-              </a:ext>
-            </a:extLst>
-          </a:blip>
-          <a:stretch>
-            <a:fillRect/>
-          </a:stretch>
-        </p:blipFill>
-        <p:spPr>
-          <a:xfrm>
-            <a:off x="0" y="0"/>
-            <a:ext cx="12192000" cy="6858000"/>
-          </a:xfrm>
-          <a:prstGeom prst="rect">
-            <a:avLst/>
-          </a:prstGeom>
-        </p:spPr>
-      </p:pic>
-      <p:sp>
-        <p:nvSpPr>
-          <p:cNvPr id="2" name="Title 1">
-            <a:extLst>
-              <a:ext uri="{FF2B5EF4-FFF2-40B4-BE49-F238E27FC236}">
-                <a16:creationId xmlns:a16="http://schemas.microsoft.com/office/drawing/2014/main" id="{CF06C4D5-7AA6-0C43-9A94-2A0B23100437}"/>
-              </a:ext>
-            </a:extLst>
-          </p:cNvPr>
-          <p:cNvSpPr>
-            <a:spLocks noGrp="1"/>
-          </p:cNvSpPr>
-          <p:nvPr>
-            <p:ph type="title"/>
-          </p:nvPr>
-        </p:nvSpPr>
-        <p:spPr>
-          <a:xfrm>
-            <a:off x="913774" y="1365957"/>
-            <a:ext cx="10364452" cy="4041422"/>
-          </a:xfrm>
-        </p:spPr>
-        <p:txBody>
-          <a:bodyPr vert="horz" lIns="91440" tIns="45720" rIns="91440" bIns="45720" rtlCol="0" anchor="ctr">
-            <a:normAutofit/>
-          </a:bodyPr>
-          <a:lstStyle/>
-          <a:p>
-            <a:r>
-              <a:rPr lang="en-US" sz="8000" dirty="0"/>
-              <a:t>Cold vs. warm cache</a:t>
-            </a:r>
-          </a:p>
-        </p:txBody>
-      </p:sp>
-    </p:spTree>
-    <p:extLst>
-      <p:ext uri="{BB962C8B-B14F-4D97-AF65-F5344CB8AC3E}">
-        <p14:creationId xmlns:p14="http://schemas.microsoft.com/office/powerpoint/2010/main" val="2230686983"/>
-      </p:ext>
-    </p:extLst>
-  </p:cSld>
-  <p:clrMapOvr>
-    <a:masterClrMapping/>
-  </p:clrMapOvr>
-  <mc:AlternateContent xmlns:mc="http://schemas.openxmlformats.org/markup-compatibility/2006">
-    <mc:Choice xmlns:p14="http://schemas.microsoft.com/office/powerpoint/2010/main" Requires="p14">
-      <p:transition spd="slow" p14:dur="1600">
-        <p14:conveyor dir="l"/>
-      </p:transition>
-    </mc:Choice>
-    <mc:Fallback>
-      <p:transition spd="slow">
-        <p:fade/>
-      </p:transition>
-    </mc:Fallback>
-  </mc:AlternateContent>
-</p:sld>
-</file>
-
-<file path=ppt/slides/slide11.xml><?xml version="1.0" encoding="utf-8"?>
-<p:sld xmlns:a="http://schemas.openxmlformats.org/drawingml/2006/main" xmlns:r="http://schemas.openxmlformats.org/officeDocument/2006/relationships" xmlns:p="http://schemas.openxmlformats.org/presentationml/2006/main">
-  <p:cSld>
-    <p:bg>
-      <p:bgPr>
-        <a:gradFill rotWithShape="1">
-          <a:gsLst>
-            <a:gs pos="0">
-              <a:schemeClr val="bg1">
-                <a:tint val="90000"/>
-                <a:lumMod val="110000"/>
-              </a:schemeClr>
-            </a:gs>
-            <a:gs pos="100000">
-              <a:schemeClr val="bg1">
-                <a:shade val="64000"/>
-                <a:lumMod val="88000"/>
-              </a:schemeClr>
-            </a:gs>
-          </a:gsLst>
-          <a:lin ang="5400000" scaled="0"/>
-        </a:gradFill>
-        <a:effectLst/>
-      </p:bgPr>
-    </p:bg>
-    <p:spTree>
-      <p:nvGrpSpPr>
-        <p:cNvPr id="1" name=""/>
-        <p:cNvGrpSpPr/>
-        <p:nvPr/>
-      </p:nvGrpSpPr>
-      <p:grpSpPr>
-        <a:xfrm>
-          <a:off x="0" y="0"/>
-          <a:ext cx="0" cy="0"/>
-          <a:chOff x="0" y="0"/>
-          <a:chExt cx="0" cy="0"/>
-        </a:xfrm>
-      </p:grpSpPr>
-      <p:pic>
-        <p:nvPicPr>
-          <p:cNvPr id="7" name="Picture 2">
-            <a:extLst>
-              <a:ext uri="{FF2B5EF4-FFF2-40B4-BE49-F238E27FC236}">
-                <a16:creationId xmlns:a16="http://schemas.microsoft.com/office/drawing/2014/main" id="{9A0F0AC6-A89F-416B-9FA4-48E664065E73}"/>
-              </a:ext>
-              <a:ext uri="{C183D7F6-B498-43B3-948B-1728B52AA6E4}">
-                <adec:decorative xmlns:adec="http://schemas.microsoft.com/office/drawing/2017/decorative" val="1"/>
-              </a:ext>
-            </a:extLst>
-          </p:cNvPr>
-          <p:cNvPicPr>
-            <a:picLocks noGrp="1" noRot="1" noChangeAspect="1" noMove="1" noResize="1" noEditPoints="1" noAdjustHandles="1" noChangeArrowheads="1" noChangeShapeType="1" noCrop="1"/>
-          </p:cNvPicPr>
-          <p:nvPr>
-            <p:extLst>
-              <p:ext uri="{386F3935-93C4-4BCD-93E2-E3B085C9AB24}">
-                <p16:designElem xmlns:p16="http://schemas.microsoft.com/office/powerpoint/2015/main" val="1"/>
-              </p:ext>
-            </p:extLst>
-          </p:nvPr>
-        </p:nvPicPr>
-        <p:blipFill>
-          <a:blip r:embed="rId2">
-            <a:alphaModFix/>
-            <a:extLst>
-              <a:ext uri="{28A0092B-C50C-407E-A947-70E740481C1C}">
-                <a14:useLocalDpi xmlns:a14="http://schemas.microsoft.com/office/drawing/2010/main" val="0"/>
-              </a:ext>
-            </a:extLst>
-          </a:blip>
-          <a:srcRect/>
-          <a:stretch>
-            <a:fillRect/>
-          </a:stretch>
-        </p:blipFill>
-        <p:spPr bwMode="auto">
-          <a:xfrm>
-            <a:off x="0" y="-1"/>
-            <a:ext cx="12192003" cy="6858001"/>
-          </a:xfrm>
-          <a:prstGeom prst="rect">
-            <a:avLst/>
-          </a:prstGeom>
-          <a:noFill/>
-          <a:extLst>
-            <a:ext uri="{909E8E84-426E-40DD-AFC4-6F175D3DCCD1}">
-              <a14:hiddenFill xmlns:a14="http://schemas.microsoft.com/office/drawing/2010/main">
-                <a:solidFill>
-                  <a:srgbClr val="FFFFFF"/>
-                </a:solidFill>
-              </a14:hiddenFill>
-            </a:ext>
-          </a:extLst>
-        </p:spPr>
-      </p:pic>
-      <p:pic>
-        <p:nvPicPr>
-          <p:cNvPr id="9" name="Picture 8">
-            <a:extLst>
-              <a:ext uri="{FF2B5EF4-FFF2-40B4-BE49-F238E27FC236}">
-                <a16:creationId xmlns:a16="http://schemas.microsoft.com/office/drawing/2014/main" id="{C31AA009-40AD-4098-8AE7-680CA35C6EAA}"/>
-              </a:ext>
-              <a:ext uri="{C183D7F6-B498-43B3-948B-1728B52AA6E4}">
-                <adec:decorative xmlns:adec="http://schemas.microsoft.com/office/drawing/2017/decorative" val="1"/>
-              </a:ext>
-            </a:extLst>
-          </p:cNvPr>
-          <p:cNvPicPr>
-            <a:picLocks noGrp="1" noRot="1" noChangeAspect="1" noMove="1" noResize="1" noEditPoints="1" noAdjustHandles="1" noChangeArrowheads="1" noChangeShapeType="1" noCrop="1"/>
-          </p:cNvPicPr>
-          <p:nvPr>
-            <p:extLst>
-              <p:ext uri="{386F3935-93C4-4BCD-93E2-E3B085C9AB24}">
-                <p16:designElem xmlns:p16="http://schemas.microsoft.com/office/powerpoint/2015/main" val="1"/>
-              </p:ext>
-            </p:extLst>
-          </p:nvPr>
-        </p:nvPicPr>
-        <p:blipFill>
-          <a:blip r:embed="rId3">
-            <a:extLst>
-              <a:ext uri="{28A0092B-C50C-407E-A947-70E740481C1C}">
-                <a14:useLocalDpi xmlns:a14="http://schemas.microsoft.com/office/drawing/2010/main" val="0"/>
-              </a:ext>
-            </a:extLst>
-          </a:blip>
-          <a:stretch>
-            <a:fillRect/>
-          </a:stretch>
-        </p:blipFill>
-        <p:spPr>
-          <a:xfrm>
-            <a:off x="0" y="0"/>
-            <a:ext cx="12192000" cy="6858000"/>
-          </a:xfrm>
-          <a:prstGeom prst="rect">
-            <a:avLst/>
-          </a:prstGeom>
-        </p:spPr>
-      </p:pic>
-      <p:sp useBgFill="1">
-        <p:nvSpPr>
-          <p:cNvPr id="11" name="Rectangle 10">
-            <a:extLst>
-              <a:ext uri="{FF2B5EF4-FFF2-40B4-BE49-F238E27FC236}">
-                <a16:creationId xmlns:a16="http://schemas.microsoft.com/office/drawing/2014/main" id="{B63B6C0C-65BB-4F38-9C8A-0892266F8BC3}"/>
-              </a:ext>
-              <a:ext uri="{C183D7F6-B498-43B3-948B-1728B52AA6E4}">
-                <adec:decorative xmlns:adec="http://schemas.microsoft.com/office/drawing/2017/decorative" val="1"/>
-              </a:ext>
-            </a:extLst>
-          </p:cNvPr>
-          <p:cNvSpPr>
-            <a:spLocks noGrp="1" noRot="1" noChangeAspect="1" noMove="1" noResize="1" noEditPoints="1" noAdjustHandles="1" noChangeArrowheads="1" noChangeShapeType="1" noTextEdit="1"/>
-          </p:cNvSpPr>
-          <p:nvPr>
-            <p:extLst>
-              <p:ext uri="{386F3935-93C4-4BCD-93E2-E3B085C9AB24}">
-                <p16:designElem xmlns:p16="http://schemas.microsoft.com/office/powerpoint/2015/main" val="1"/>
-              </p:ext>
-            </p:extLst>
-          </p:nvPr>
-        </p:nvSpPr>
-        <p:spPr>
-          <a:xfrm>
-            <a:off x="0" y="0"/>
-            <a:ext cx="12192000" cy="6858000"/>
-          </a:xfrm>
-          <a:prstGeom prst="rect">
-            <a:avLst/>
-          </a:prstGeom>
-          <a:ln>
-            <a:noFill/>
-          </a:ln>
-        </p:spPr>
-        <p:style>
-          <a:lnRef idx="2">
-            <a:schemeClr val="accent1">
-              <a:shade val="50000"/>
-            </a:schemeClr>
-          </a:lnRef>
-          <a:fillRef idx="1">
-            <a:schemeClr val="accent1"/>
-          </a:fillRef>
-          <a:effectRef idx="0">
-            <a:schemeClr val="accent1"/>
-          </a:effectRef>
-          <a:fontRef idx="minor">
-            <a:schemeClr val="lt1"/>
-          </a:fontRef>
-        </p:style>
-        <p:txBody>
-          <a:bodyPr rtlCol="0" anchor="ctr"/>
-          <a:lstStyle/>
-          <a:p>
-            <a:pPr algn="ctr"/>
-            <a:endParaRPr lang="en-US" dirty="0"/>
-          </a:p>
-        </p:txBody>
-      </p:sp>
-      <p:pic>
-        <p:nvPicPr>
-          <p:cNvPr id="13" name="Picture 12">
-            <a:extLst>
-              <a:ext uri="{FF2B5EF4-FFF2-40B4-BE49-F238E27FC236}">
-                <a16:creationId xmlns:a16="http://schemas.microsoft.com/office/drawing/2014/main" id="{09D77137-01B7-45E4-AA14-CD9E779B443C}"/>
-              </a:ext>
-              <a:ext uri="{C183D7F6-B498-43B3-948B-1728B52AA6E4}">
-                <adec:decorative xmlns:adec="http://schemas.microsoft.com/office/drawing/2017/decorative" val="1"/>
-              </a:ext>
-            </a:extLst>
-          </p:cNvPr>
-          <p:cNvPicPr>
-            <a:picLocks noGrp="1" noRot="1" noChangeAspect="1" noMove="1" noResize="1" noEditPoints="1" noAdjustHandles="1" noChangeArrowheads="1" noChangeShapeType="1" noCrop="1"/>
-          </p:cNvPicPr>
-          <p:nvPr>
-            <p:extLst>
-              <p:ext uri="{386F3935-93C4-4BCD-93E2-E3B085C9AB24}">
-                <p16:designElem xmlns:p16="http://schemas.microsoft.com/office/powerpoint/2015/main" val="1"/>
-              </p:ext>
-            </p:extLst>
-          </p:nvPr>
-        </p:nvPicPr>
-        <p:blipFill>
-          <a:blip r:embed="rId3">
-            <a:extLst>
-              <a:ext uri="{28A0092B-C50C-407E-A947-70E740481C1C}">
-                <a14:useLocalDpi xmlns:a14="http://schemas.microsoft.com/office/drawing/2010/main" val="0"/>
-              </a:ext>
-            </a:extLst>
-          </a:blip>
-          <a:stretch>
-            <a:fillRect/>
-          </a:stretch>
-        </p:blipFill>
-        <p:spPr>
-          <a:xfrm>
-            <a:off x="0" y="0"/>
-            <a:ext cx="12192000" cy="6858000"/>
-          </a:xfrm>
-          <a:prstGeom prst="rect">
-            <a:avLst/>
-          </a:prstGeom>
-        </p:spPr>
-      </p:pic>
-      <p:sp>
-        <p:nvSpPr>
-          <p:cNvPr id="2" name="Title 1">
-            <a:extLst>
-              <a:ext uri="{FF2B5EF4-FFF2-40B4-BE49-F238E27FC236}">
-                <a16:creationId xmlns:a16="http://schemas.microsoft.com/office/drawing/2014/main" id="{CF06C4D5-7AA6-0C43-9A94-2A0B23100437}"/>
-              </a:ext>
-            </a:extLst>
-          </p:cNvPr>
-          <p:cNvSpPr>
-            <a:spLocks noGrp="1"/>
-          </p:cNvSpPr>
-          <p:nvPr>
-            <p:ph type="title"/>
-          </p:nvPr>
-        </p:nvSpPr>
-        <p:spPr>
-          <a:xfrm>
-            <a:off x="913774" y="1365957"/>
-            <a:ext cx="10364452" cy="4041422"/>
-          </a:xfrm>
-        </p:spPr>
-        <p:txBody>
-          <a:bodyPr vert="horz" lIns="91440" tIns="45720" rIns="91440" bIns="45720" rtlCol="0" anchor="ctr">
-            <a:normAutofit/>
-          </a:bodyPr>
-          <a:lstStyle/>
-          <a:p>
-            <a:r>
-              <a:rPr lang="en-US" sz="8000" dirty="0"/>
-              <a:t>memoization in Python 3.9+</a:t>
-            </a:r>
-          </a:p>
-        </p:txBody>
-      </p:sp>
-    </p:spTree>
-    <p:extLst>
-      <p:ext uri="{BB962C8B-B14F-4D97-AF65-F5344CB8AC3E}">
-        <p14:creationId xmlns:p14="http://schemas.microsoft.com/office/powerpoint/2010/main" val="942030753"/>
-      </p:ext>
-    </p:extLst>
-  </p:cSld>
-  <p:clrMapOvr>
-    <a:masterClrMapping/>
-  </p:clrMapOvr>
-  <mc:AlternateContent xmlns:mc="http://schemas.openxmlformats.org/markup-compatibility/2006">
-    <mc:Choice xmlns:p14="http://schemas.microsoft.com/office/powerpoint/2010/main" Requires="p14">
-      <p:transition spd="slow" p14:dur="1600">
-        <p14:conveyor dir="l"/>
-      </p:transition>
-    </mc:Choice>
-    <mc:Fallback>
-      <p:transition spd="slow">
-        <p:fade/>
-      </p:transition>
-    </mc:Fallback>
-  </mc:AlternateContent>
-</p:sld>
-</file>
-
-<file path=ppt/slides/slide12.xml><?xml version="1.0" encoding="utf-8"?>
-<p:sld xmlns:a="http://schemas.openxmlformats.org/drawingml/2006/main" xmlns:r="http://schemas.openxmlformats.org/officeDocument/2006/relationships" xmlns:p="http://schemas.openxmlformats.org/presentationml/2006/main">
-  <p:cSld>
-    <p:bg>
-      <p:bgPr>
-        <a:gradFill rotWithShape="1">
-          <a:gsLst>
-            <a:gs pos="0">
-              <a:schemeClr val="bg1">
-                <a:tint val="90000"/>
-                <a:lumMod val="110000"/>
-              </a:schemeClr>
-            </a:gs>
-            <a:gs pos="100000">
-              <a:schemeClr val="bg1">
-                <a:shade val="64000"/>
-                <a:lumMod val="88000"/>
-              </a:schemeClr>
-            </a:gs>
-          </a:gsLst>
-          <a:lin ang="5400000" scaled="0"/>
-        </a:gradFill>
-        <a:effectLst/>
-      </p:bgPr>
-    </p:bg>
-    <p:spTree>
-      <p:nvGrpSpPr>
-        <p:cNvPr id="1" name=""/>
-        <p:cNvGrpSpPr/>
-        <p:nvPr/>
-      </p:nvGrpSpPr>
-      <p:grpSpPr>
-        <a:xfrm>
-          <a:off x="0" y="0"/>
-          <a:ext cx="0" cy="0"/>
-          <a:chOff x="0" y="0"/>
-          <a:chExt cx="0" cy="0"/>
-        </a:xfrm>
-      </p:grpSpPr>
-      <p:pic>
-        <p:nvPicPr>
-          <p:cNvPr id="7" name="Picture 2">
-            <a:extLst>
-              <a:ext uri="{FF2B5EF4-FFF2-40B4-BE49-F238E27FC236}">
-                <a16:creationId xmlns:a16="http://schemas.microsoft.com/office/drawing/2014/main" id="{9A0F0AC6-A89F-416B-9FA4-48E664065E73}"/>
-              </a:ext>
-              <a:ext uri="{C183D7F6-B498-43B3-948B-1728B52AA6E4}">
-                <adec:decorative xmlns:adec="http://schemas.microsoft.com/office/drawing/2017/decorative" val="1"/>
-              </a:ext>
-            </a:extLst>
-          </p:cNvPr>
-          <p:cNvPicPr>
-            <a:picLocks noGrp="1" noRot="1" noChangeAspect="1" noMove="1" noResize="1" noEditPoints="1" noAdjustHandles="1" noChangeArrowheads="1" noChangeShapeType="1" noCrop="1"/>
-          </p:cNvPicPr>
-          <p:nvPr>
-            <p:extLst>
-              <p:ext uri="{386F3935-93C4-4BCD-93E2-E3B085C9AB24}">
-                <p16:designElem xmlns:p16="http://schemas.microsoft.com/office/powerpoint/2015/main" val="1"/>
-              </p:ext>
-            </p:extLst>
-          </p:nvPr>
-        </p:nvPicPr>
-        <p:blipFill>
-          <a:blip r:embed="rId2">
-            <a:alphaModFix/>
-            <a:extLst>
-              <a:ext uri="{28A0092B-C50C-407E-A947-70E740481C1C}">
-                <a14:useLocalDpi xmlns:a14="http://schemas.microsoft.com/office/drawing/2010/main" val="0"/>
-              </a:ext>
-            </a:extLst>
-          </a:blip>
-          <a:srcRect/>
-          <a:stretch>
-            <a:fillRect/>
-          </a:stretch>
-        </p:blipFill>
-        <p:spPr bwMode="auto">
-          <a:xfrm>
-            <a:off x="0" y="-1"/>
-            <a:ext cx="12192003" cy="6858001"/>
-          </a:xfrm>
-          <a:prstGeom prst="rect">
-            <a:avLst/>
-          </a:prstGeom>
-          <a:noFill/>
-          <a:extLst>
-            <a:ext uri="{909E8E84-426E-40DD-AFC4-6F175D3DCCD1}">
-              <a14:hiddenFill xmlns:a14="http://schemas.microsoft.com/office/drawing/2010/main">
-                <a:solidFill>
-                  <a:srgbClr val="FFFFFF"/>
-                </a:solidFill>
-              </a14:hiddenFill>
-            </a:ext>
-          </a:extLst>
-        </p:spPr>
-      </p:pic>
-      <p:pic>
-        <p:nvPicPr>
-          <p:cNvPr id="9" name="Picture 8">
-            <a:extLst>
-              <a:ext uri="{FF2B5EF4-FFF2-40B4-BE49-F238E27FC236}">
-                <a16:creationId xmlns:a16="http://schemas.microsoft.com/office/drawing/2014/main" id="{C31AA009-40AD-4098-8AE7-680CA35C6EAA}"/>
-              </a:ext>
-              <a:ext uri="{C183D7F6-B498-43B3-948B-1728B52AA6E4}">
-                <adec:decorative xmlns:adec="http://schemas.microsoft.com/office/drawing/2017/decorative" val="1"/>
-              </a:ext>
-            </a:extLst>
-          </p:cNvPr>
-          <p:cNvPicPr>
-            <a:picLocks noGrp="1" noRot="1" noChangeAspect="1" noMove="1" noResize="1" noEditPoints="1" noAdjustHandles="1" noChangeArrowheads="1" noChangeShapeType="1" noCrop="1"/>
-          </p:cNvPicPr>
-          <p:nvPr>
-            <p:extLst>
-              <p:ext uri="{386F3935-93C4-4BCD-93E2-E3B085C9AB24}">
-                <p16:designElem xmlns:p16="http://schemas.microsoft.com/office/powerpoint/2015/main" val="1"/>
-              </p:ext>
-            </p:extLst>
-          </p:nvPr>
-        </p:nvPicPr>
-        <p:blipFill>
-          <a:blip r:embed="rId3">
-            <a:extLst>
-              <a:ext uri="{28A0092B-C50C-407E-A947-70E740481C1C}">
-                <a14:useLocalDpi xmlns:a14="http://schemas.microsoft.com/office/drawing/2010/main" val="0"/>
-              </a:ext>
-            </a:extLst>
-          </a:blip>
-          <a:stretch>
-            <a:fillRect/>
-          </a:stretch>
-        </p:blipFill>
-        <p:spPr>
-          <a:xfrm>
-            <a:off x="0" y="0"/>
-            <a:ext cx="12192000" cy="6858000"/>
-          </a:xfrm>
-          <a:prstGeom prst="rect">
-            <a:avLst/>
-          </a:prstGeom>
-        </p:spPr>
-      </p:pic>
-      <p:sp useBgFill="1">
-        <p:nvSpPr>
-          <p:cNvPr id="11" name="Rectangle 10">
-            <a:extLst>
-              <a:ext uri="{FF2B5EF4-FFF2-40B4-BE49-F238E27FC236}">
-                <a16:creationId xmlns:a16="http://schemas.microsoft.com/office/drawing/2014/main" id="{B63B6C0C-65BB-4F38-9C8A-0892266F8BC3}"/>
-              </a:ext>
-              <a:ext uri="{C183D7F6-B498-43B3-948B-1728B52AA6E4}">
-                <adec:decorative xmlns:adec="http://schemas.microsoft.com/office/drawing/2017/decorative" val="1"/>
-              </a:ext>
-            </a:extLst>
-          </p:cNvPr>
-          <p:cNvSpPr>
-            <a:spLocks noGrp="1" noRot="1" noChangeAspect="1" noMove="1" noResize="1" noEditPoints="1" noAdjustHandles="1" noChangeArrowheads="1" noChangeShapeType="1" noTextEdit="1"/>
-          </p:cNvSpPr>
-          <p:nvPr>
-            <p:extLst>
-              <p:ext uri="{386F3935-93C4-4BCD-93E2-E3B085C9AB24}">
-                <p16:designElem xmlns:p16="http://schemas.microsoft.com/office/powerpoint/2015/main" val="1"/>
-              </p:ext>
-            </p:extLst>
-          </p:nvPr>
-        </p:nvSpPr>
-        <p:spPr>
-          <a:xfrm>
-            <a:off x="0" y="0"/>
-            <a:ext cx="12192000" cy="6858000"/>
-          </a:xfrm>
-          <a:prstGeom prst="rect">
-            <a:avLst/>
-          </a:prstGeom>
-          <a:ln>
-            <a:noFill/>
-          </a:ln>
-        </p:spPr>
-        <p:style>
-          <a:lnRef idx="2">
-            <a:schemeClr val="accent1">
-              <a:shade val="50000"/>
-            </a:schemeClr>
-          </a:lnRef>
-          <a:fillRef idx="1">
-            <a:schemeClr val="accent1"/>
-          </a:fillRef>
-          <a:effectRef idx="0">
-            <a:schemeClr val="accent1"/>
-          </a:effectRef>
-          <a:fontRef idx="minor">
-            <a:schemeClr val="lt1"/>
-          </a:fontRef>
-        </p:style>
-        <p:txBody>
-          <a:bodyPr rtlCol="0" anchor="ctr"/>
-          <a:lstStyle/>
-          <a:p>
-            <a:pPr algn="ctr"/>
-            <a:endParaRPr lang="en-US" dirty="0"/>
-          </a:p>
-        </p:txBody>
-      </p:sp>
-      <p:pic>
-        <p:nvPicPr>
-          <p:cNvPr id="13" name="Picture 12">
-            <a:extLst>
-              <a:ext uri="{FF2B5EF4-FFF2-40B4-BE49-F238E27FC236}">
-                <a16:creationId xmlns:a16="http://schemas.microsoft.com/office/drawing/2014/main" id="{09D77137-01B7-45E4-AA14-CD9E779B443C}"/>
-              </a:ext>
-              <a:ext uri="{C183D7F6-B498-43B3-948B-1728B52AA6E4}">
-                <adec:decorative xmlns:adec="http://schemas.microsoft.com/office/drawing/2017/decorative" val="1"/>
-              </a:ext>
-            </a:extLst>
-          </p:cNvPr>
-          <p:cNvPicPr>
-            <a:picLocks noGrp="1" noRot="1" noChangeAspect="1" noMove="1" noResize="1" noEditPoints="1" noAdjustHandles="1" noChangeArrowheads="1" noChangeShapeType="1" noCrop="1"/>
-          </p:cNvPicPr>
-          <p:nvPr>
-            <p:extLst>
-              <p:ext uri="{386F3935-93C4-4BCD-93E2-E3B085C9AB24}">
-                <p16:designElem xmlns:p16="http://schemas.microsoft.com/office/powerpoint/2015/main" val="1"/>
-              </p:ext>
-            </p:extLst>
-          </p:nvPr>
-        </p:nvPicPr>
-        <p:blipFill>
-          <a:blip r:embed="rId3">
-            <a:extLst>
-              <a:ext uri="{28A0092B-C50C-407E-A947-70E740481C1C}">
-                <a14:useLocalDpi xmlns:a14="http://schemas.microsoft.com/office/drawing/2010/main" val="0"/>
-              </a:ext>
-            </a:extLst>
-          </a:blip>
-          <a:stretch>
-            <a:fillRect/>
-          </a:stretch>
-        </p:blipFill>
-        <p:spPr>
-          <a:xfrm>
-            <a:off x="0" y="0"/>
-            <a:ext cx="12192000" cy="6858000"/>
-          </a:xfrm>
-          <a:prstGeom prst="rect">
-            <a:avLst/>
-          </a:prstGeom>
-        </p:spPr>
-      </p:pic>
-      <p:sp>
-        <p:nvSpPr>
-          <p:cNvPr id="2" name="Title 1">
-            <a:extLst>
-              <a:ext uri="{FF2B5EF4-FFF2-40B4-BE49-F238E27FC236}">
-                <a16:creationId xmlns:a16="http://schemas.microsoft.com/office/drawing/2014/main" id="{CF06C4D5-7AA6-0C43-9A94-2A0B23100437}"/>
-              </a:ext>
-            </a:extLst>
-          </p:cNvPr>
-          <p:cNvSpPr>
-            <a:spLocks noGrp="1"/>
-          </p:cNvSpPr>
-          <p:nvPr>
-            <p:ph type="title"/>
-          </p:nvPr>
-        </p:nvSpPr>
-        <p:spPr>
-          <a:xfrm>
-            <a:off x="913774" y="1365957"/>
-            <a:ext cx="10364452" cy="4041422"/>
-          </a:xfrm>
-        </p:spPr>
-        <p:txBody>
-          <a:bodyPr vert="horz" lIns="91440" tIns="45720" rIns="91440" bIns="45720" rtlCol="0" anchor="ctr">
-            <a:normAutofit/>
-          </a:bodyPr>
-          <a:lstStyle/>
-          <a:p>
-            <a:r>
-              <a:rPr lang="en-US" sz="8000" dirty="0"/>
-              <a:t>Monitoring caching behavior</a:t>
-            </a:r>
-          </a:p>
-        </p:txBody>
-      </p:sp>
-    </p:spTree>
-    <p:extLst>
-      <p:ext uri="{BB962C8B-B14F-4D97-AF65-F5344CB8AC3E}">
-        <p14:creationId xmlns:p14="http://schemas.microsoft.com/office/powerpoint/2010/main" val="422017673"/>
-      </p:ext>
-    </p:extLst>
-  </p:cSld>
-  <p:clrMapOvr>
-    <a:masterClrMapping/>
-  </p:clrMapOvr>
-  <mc:AlternateContent xmlns:mc="http://schemas.openxmlformats.org/markup-compatibility/2006">
-    <mc:Choice xmlns:p14="http://schemas.microsoft.com/office/powerpoint/2010/main" Requires="p14">
-      <p:transition spd="slow" p14:dur="1600">
-        <p14:conveyor dir="l"/>
-      </p:transition>
-    </mc:Choice>
-    <mc:Fallback>
-      <p:transition spd="slow">
-        <p:fade/>
-      </p:transition>
-    </mc:Fallback>
-  </mc:AlternateContent>
-</p:sld>
-</file>
-
-<file path=ppt/slides/slide13.xml><?xml version="1.0" encoding="utf-8"?>
-<p:sld xmlns:a="http://schemas.openxmlformats.org/drawingml/2006/main" xmlns:r="http://schemas.openxmlformats.org/officeDocument/2006/relationships" xmlns:p="http://schemas.openxmlformats.org/presentationml/2006/main">
-  <p:cSld>
-    <p:spTree>
-      <p:nvGrpSpPr>
-        <p:cNvPr id="1" name=""/>
-        <p:cNvGrpSpPr/>
-        <p:nvPr/>
-      </p:nvGrpSpPr>
-      <p:grpSpPr>
-        <a:xfrm>
-          <a:off x="0" y="0"/>
-          <a:ext cx="0" cy="0"/>
-          <a:chOff x="0" y="0"/>
-          <a:chExt cx="0" cy="0"/>
-        </a:xfrm>
-      </p:grpSpPr>
-      <p:sp>
-        <p:nvSpPr>
-          <p:cNvPr id="2" name="Title 1">
-            <a:extLst>
-              <a:ext uri="{FF2B5EF4-FFF2-40B4-BE49-F238E27FC236}">
-                <a16:creationId xmlns:a16="http://schemas.microsoft.com/office/drawing/2014/main" id="{ABD15FE4-E12E-8C4D-BFD8-FEABFE4AD456}"/>
-              </a:ext>
-            </a:extLst>
-          </p:cNvPr>
-          <p:cNvSpPr>
-            <a:spLocks noGrp="1"/>
-          </p:cNvSpPr>
-          <p:nvPr>
-            <p:ph type="title"/>
-          </p:nvPr>
-        </p:nvSpPr>
-        <p:spPr/>
-        <p:txBody>
-          <a:bodyPr/>
-          <a:lstStyle/>
-          <a:p>
-            <a:r>
-              <a:rPr lang="en-US" dirty="0"/>
-              <a:t>conclusion</a:t>
-            </a:r>
-          </a:p>
-        </p:txBody>
-      </p:sp>
-      <p:sp>
-        <p:nvSpPr>
-          <p:cNvPr id="3" name="Content Placeholder 2">
-            <a:extLst>
-              <a:ext uri="{FF2B5EF4-FFF2-40B4-BE49-F238E27FC236}">
-                <a16:creationId xmlns:a16="http://schemas.microsoft.com/office/drawing/2014/main" id="{AF549E37-1647-064C-9B3A-C6F128153E3C}"/>
-              </a:ext>
-            </a:extLst>
-          </p:cNvPr>
-          <p:cNvSpPr>
-            <a:spLocks noGrp="1"/>
-          </p:cNvSpPr>
-          <p:nvPr>
-            <p:ph sz="quarter" idx="13"/>
-          </p:nvPr>
-        </p:nvSpPr>
-        <p:spPr/>
-        <p:txBody>
-          <a:bodyPr/>
-          <a:lstStyle/>
-          <a:p>
-            <a:r>
-              <a:rPr lang="en-US" dirty="0"/>
-              <a:t>A Simple construct may bear a complex behavior.</a:t>
-            </a:r>
-          </a:p>
-          <a:p>
-            <a:r>
-              <a:rPr lang="en-US" dirty="0"/>
-              <a:t>You are fully accountable for all the code you deliver, be it explicitly or implicitly assumed.</a:t>
-            </a:r>
-          </a:p>
-          <a:p>
-            <a:r>
-              <a:rPr lang="en-US" dirty="0"/>
-              <a:t>Without knowing what is going on in the background you will not able to ship </a:t>
-            </a:r>
-            <a:r>
-              <a:rPr lang="en-US" dirty="0">
-                <a:hlinkClick r:id="rId2"/>
-              </a:rPr>
-              <a:t>dependable</a:t>
-            </a:r>
-            <a:r>
-              <a:rPr lang="en-US" dirty="0"/>
-              <a:t> solutions. </a:t>
-            </a:r>
-          </a:p>
-        </p:txBody>
-      </p:sp>
-    </p:spTree>
-    <p:extLst>
-      <p:ext uri="{BB962C8B-B14F-4D97-AF65-F5344CB8AC3E}">
-        <p14:creationId xmlns:p14="http://schemas.microsoft.com/office/powerpoint/2010/main" val="761897836"/>
-      </p:ext>
-    </p:extLst>
-  </p:cSld>
-  <p:clrMapOvr>
-    <a:masterClrMapping/>
-  </p:clrMapOvr>
-  <mc:AlternateContent xmlns:mc="http://schemas.openxmlformats.org/markup-compatibility/2006">
-    <mc:Choice xmlns:p14="http://schemas.microsoft.com/office/powerpoint/2010/main" Requires="p14">
-      <p:transition spd="slow" p14:dur="1600">
-        <p14:conveyor dir="l"/>
-      </p:transition>
-    </mc:Choice>
-    <mc:Fallback>
-      <p:transition spd="slow">
-        <p:fade/>
-      </p:transition>
-    </mc:Fallback>
-  </mc:AlternateContent>
-  <p:timing>
-    <p:tnLst>
-      <p:par>
-        <p:cTn id="1" dur="indefinite" restart="never" nodeType="tmRoot">
-          <p:childTnLst>
-            <p:seq concurrent="1" nextAc="seek">
-              <p:cTn id="2" dur="indefinite" nodeType="mainSeq">
-                <p:childTnLst>
-                  <p:par>
-                    <p:cTn id="3" fill="hold">
-                      <p:stCondLst>
-                        <p:cond delay="indefinite"/>
-                      </p:stCondLst>
-                      <p:childTnLst>
-                        <p:par>
-                          <p:cTn id="4" fill="hold">
-                            <p:stCondLst>
-                              <p:cond delay="0"/>
-                            </p:stCondLst>
-                            <p:childTnLst>
-                              <p:par>
-                                <p:cTn id="5" presetID="53" presetClass="entr" presetSubtype="16" fill="hold" grpId="0" nodeType="clickEffect">
-                                  <p:stCondLst>
-                                    <p:cond delay="0"/>
-                                  </p:stCondLst>
-                                  <p:childTnLst>
-                                    <p:set>
-                                      <p:cBhvr>
-                                        <p:cTn id="6" dur="1" fill="hold">
-                                          <p:stCondLst>
-                                            <p:cond delay="0"/>
-                                          </p:stCondLst>
-                                        </p:cTn>
-                                        <p:tgtEl>
-                                          <p:spTgt spid="3">
-                                            <p:txEl>
-                                              <p:pRg st="0" end="0"/>
-                                            </p:txEl>
-                                          </p:spTgt>
-                                        </p:tgtEl>
-                                        <p:attrNameLst>
-                                          <p:attrName>style.visibility</p:attrName>
-                                        </p:attrNameLst>
-                                      </p:cBhvr>
-                                      <p:to>
-                                        <p:strVal val="visible"/>
-                                      </p:to>
-                                    </p:set>
-                                    <p:anim calcmode="lin" valueType="num">
-                                      <p:cBhvr>
-                                        <p:cTn id="7" dur="500" fill="hold"/>
-                                        <p:tgtEl>
-                                          <p:spTgt spid="3">
-                                            <p:txEl>
-                                              <p:pRg st="0" end="0"/>
-                                            </p:txEl>
-                                          </p:spTgt>
-                                        </p:tgtEl>
-                                        <p:attrNameLst>
-                                          <p:attrName>ppt_w</p:attrName>
-                                        </p:attrNameLst>
-                                      </p:cBhvr>
-                                      <p:tavLst>
-                                        <p:tav tm="0">
-                                          <p:val>
-                                            <p:fltVal val="0"/>
-                                          </p:val>
-                                        </p:tav>
-                                        <p:tav tm="100000">
-                                          <p:val>
-                                            <p:strVal val="#ppt_w"/>
-                                          </p:val>
-                                        </p:tav>
-                                      </p:tavLst>
-                                    </p:anim>
-                                    <p:anim calcmode="lin" valueType="num">
-                                      <p:cBhvr>
-                                        <p:cTn id="8" dur="500" fill="hold"/>
-                                        <p:tgtEl>
-                                          <p:spTgt spid="3">
-                                            <p:txEl>
-                                              <p:pRg st="0" end="0"/>
-                                            </p:txEl>
-                                          </p:spTgt>
-                                        </p:tgtEl>
-                                        <p:attrNameLst>
-                                          <p:attrName>ppt_h</p:attrName>
-                                        </p:attrNameLst>
-                                      </p:cBhvr>
-                                      <p:tavLst>
-                                        <p:tav tm="0">
-                                          <p:val>
-                                            <p:fltVal val="0"/>
-                                          </p:val>
-                                        </p:tav>
-                                        <p:tav tm="100000">
-                                          <p:val>
-                                            <p:strVal val="#ppt_h"/>
-                                          </p:val>
-                                        </p:tav>
-                                      </p:tavLst>
-                                    </p:anim>
-                                    <p:animEffect transition="in" filter="fade">
-                                      <p:cBhvr>
-                                        <p:cTn id="9" dur="500"/>
-                                        <p:tgtEl>
-                                          <p:spTgt spid="3">
-                                            <p:txEl>
-                                              <p:pRg st="0" end="0"/>
-                                            </p:txEl>
-                                          </p:spTgt>
-                                        </p:tgtEl>
-                                      </p:cBhvr>
-                                    </p:animEffect>
-                                  </p:childTnLst>
-                                </p:cTn>
-                              </p:par>
-                            </p:childTnLst>
-                          </p:cTn>
-                        </p:par>
-                      </p:childTnLst>
-                    </p:cTn>
-                  </p:par>
-                  <p:par>
-                    <p:cTn id="10" fill="hold">
-                      <p:stCondLst>
-                        <p:cond delay="indefinite"/>
-                      </p:stCondLst>
-                      <p:childTnLst>
-                        <p:par>
-                          <p:cTn id="11" fill="hold">
-                            <p:stCondLst>
-                              <p:cond delay="0"/>
-                            </p:stCondLst>
-                            <p:childTnLst>
-                              <p:par>
-                                <p:cTn id="12" presetID="53" presetClass="entr" presetSubtype="16" fill="hold" grpId="0" nodeType="clickEffect">
-                                  <p:stCondLst>
-                                    <p:cond delay="0"/>
-                                  </p:stCondLst>
-                                  <p:childTnLst>
-                                    <p:set>
-                                      <p:cBhvr>
-                                        <p:cTn id="13" dur="1" fill="hold">
-                                          <p:stCondLst>
-                                            <p:cond delay="0"/>
-                                          </p:stCondLst>
-                                        </p:cTn>
-                                        <p:tgtEl>
-                                          <p:spTgt spid="3">
-                                            <p:txEl>
-                                              <p:pRg st="1" end="1"/>
-                                            </p:txEl>
-                                          </p:spTgt>
-                                        </p:tgtEl>
-                                        <p:attrNameLst>
-                                          <p:attrName>style.visibility</p:attrName>
-                                        </p:attrNameLst>
-                                      </p:cBhvr>
-                                      <p:to>
-                                        <p:strVal val="visible"/>
-                                      </p:to>
-                                    </p:set>
-                                    <p:anim calcmode="lin" valueType="num">
-                                      <p:cBhvr>
-                                        <p:cTn id="14" dur="500" fill="hold"/>
-                                        <p:tgtEl>
-                                          <p:spTgt spid="3">
-                                            <p:txEl>
-                                              <p:pRg st="1" end="1"/>
-                                            </p:txEl>
-                                          </p:spTgt>
-                                        </p:tgtEl>
-                                        <p:attrNameLst>
-                                          <p:attrName>ppt_w</p:attrName>
-                                        </p:attrNameLst>
-                                      </p:cBhvr>
-                                      <p:tavLst>
-                                        <p:tav tm="0">
-                                          <p:val>
-                                            <p:fltVal val="0"/>
-                                          </p:val>
-                                        </p:tav>
-                                        <p:tav tm="100000">
-                                          <p:val>
-                                            <p:strVal val="#ppt_w"/>
-                                          </p:val>
-                                        </p:tav>
-                                      </p:tavLst>
-                                    </p:anim>
-                                    <p:anim calcmode="lin" valueType="num">
-                                      <p:cBhvr>
-                                        <p:cTn id="15" dur="500" fill="hold"/>
-                                        <p:tgtEl>
-                                          <p:spTgt spid="3">
-                                            <p:txEl>
-                                              <p:pRg st="1" end="1"/>
-                                            </p:txEl>
-                                          </p:spTgt>
-                                        </p:tgtEl>
-                                        <p:attrNameLst>
-                                          <p:attrName>ppt_h</p:attrName>
-                                        </p:attrNameLst>
-                                      </p:cBhvr>
-                                      <p:tavLst>
-                                        <p:tav tm="0">
-                                          <p:val>
-                                            <p:fltVal val="0"/>
-                                          </p:val>
-                                        </p:tav>
-                                        <p:tav tm="100000">
-                                          <p:val>
-                                            <p:strVal val="#ppt_h"/>
-                                          </p:val>
-                                        </p:tav>
-                                      </p:tavLst>
-                                    </p:anim>
-                                    <p:animEffect transition="in" filter="fade">
-                                      <p:cBhvr>
-                                        <p:cTn id="16" dur="500"/>
-                                        <p:tgtEl>
-                                          <p:spTgt spid="3">
-                                            <p:txEl>
-                                              <p:pRg st="1" end="1"/>
-                                            </p:txEl>
-                                          </p:spTgt>
-                                        </p:tgtEl>
-                                      </p:cBhvr>
-                                    </p:animEffect>
-                                  </p:childTnLst>
-                                </p:cTn>
-                              </p:par>
-                            </p:childTnLst>
-                          </p:cTn>
-                        </p:par>
-                      </p:childTnLst>
-                    </p:cTn>
-                  </p:par>
-                  <p:par>
-                    <p:cTn id="17" fill="hold">
-                      <p:stCondLst>
-                        <p:cond delay="indefinite"/>
-                      </p:stCondLst>
-                      <p:childTnLst>
-                        <p:par>
-                          <p:cTn id="18" fill="hold">
-                            <p:stCondLst>
-                              <p:cond delay="0"/>
-                            </p:stCondLst>
-                            <p:childTnLst>
-                              <p:par>
-                                <p:cTn id="19" presetID="53" presetClass="entr" presetSubtype="16" fill="hold" grpId="0" nodeType="clickEffect">
-                                  <p:stCondLst>
-                                    <p:cond delay="0"/>
-                                  </p:stCondLst>
-                                  <p:childTnLst>
-                                    <p:set>
-                                      <p:cBhvr>
-                                        <p:cTn id="20" dur="1" fill="hold">
-                                          <p:stCondLst>
-                                            <p:cond delay="0"/>
-                                          </p:stCondLst>
-                                        </p:cTn>
-                                        <p:tgtEl>
-                                          <p:spTgt spid="3">
-                                            <p:txEl>
-                                              <p:pRg st="2" end="2"/>
-                                            </p:txEl>
-                                          </p:spTgt>
-                                        </p:tgtEl>
-                                        <p:attrNameLst>
-                                          <p:attrName>style.visibility</p:attrName>
-                                        </p:attrNameLst>
-                                      </p:cBhvr>
-                                      <p:to>
-                                        <p:strVal val="visible"/>
-                                      </p:to>
-                                    </p:set>
-                                    <p:anim calcmode="lin" valueType="num">
-                                      <p:cBhvr>
-                                        <p:cTn id="21" dur="500" fill="hold"/>
-                                        <p:tgtEl>
-                                          <p:spTgt spid="3">
-                                            <p:txEl>
-                                              <p:pRg st="2" end="2"/>
-                                            </p:txEl>
-                                          </p:spTgt>
-                                        </p:tgtEl>
-                                        <p:attrNameLst>
-                                          <p:attrName>ppt_w</p:attrName>
-                                        </p:attrNameLst>
-                                      </p:cBhvr>
-                                      <p:tavLst>
-                                        <p:tav tm="0">
-                                          <p:val>
-                                            <p:fltVal val="0"/>
-                                          </p:val>
-                                        </p:tav>
-                                        <p:tav tm="100000">
-                                          <p:val>
-                                            <p:strVal val="#ppt_w"/>
-                                          </p:val>
-                                        </p:tav>
-                                      </p:tavLst>
-                                    </p:anim>
-                                    <p:anim calcmode="lin" valueType="num">
-                                      <p:cBhvr>
-                                        <p:cTn id="22" dur="500" fill="hold"/>
-                                        <p:tgtEl>
-                                          <p:spTgt spid="3">
-                                            <p:txEl>
-                                              <p:pRg st="2" end="2"/>
-                                            </p:txEl>
-                                          </p:spTgt>
-                                        </p:tgtEl>
-                                        <p:attrNameLst>
-                                          <p:attrName>ppt_h</p:attrName>
-                                        </p:attrNameLst>
-                                      </p:cBhvr>
-                                      <p:tavLst>
-                                        <p:tav tm="0">
-                                          <p:val>
-                                            <p:fltVal val="0"/>
-                                          </p:val>
-                                        </p:tav>
-                                        <p:tav tm="100000">
-                                          <p:val>
-                                            <p:strVal val="#ppt_h"/>
-                                          </p:val>
-                                        </p:tav>
-                                      </p:tavLst>
-                                    </p:anim>
-                                    <p:animEffect transition="in" filter="fade">
-                                      <p:cBhvr>
-                                        <p:cTn id="23" dur="500"/>
-                                        <p:tgtEl>
-                                          <p:spTgt spid="3">
-                                            <p:txEl>
-                                              <p:pRg st="2" end="2"/>
-                                            </p:txEl>
-                                          </p:spTgt>
-                                        </p:tgtEl>
-                                      </p:cBhvr>
-                                    </p:animEffect>
-                                  </p:childTnLst>
-                                </p:cTn>
-                              </p:par>
-                            </p:childTnLst>
-                          </p:cTn>
-                        </p:par>
-                      </p:childTnLst>
-                    </p:cTn>
-                  </p:par>
-                </p:childTnLst>
-              </p:cTn>
-              <p:prevCondLst>
-                <p:cond evt="onPrev" delay="0">
-                  <p:tgtEl>
-                    <p:sldTgt/>
-                  </p:tgtEl>
-                </p:cond>
-              </p:prevCondLst>
-              <p:nextCondLst>
-                <p:cond evt="onNext" delay="0">
-                  <p:tgtEl>
-                    <p:sldTgt/>
-                  </p:tgtEl>
-                </p:cond>
-              </p:nextCondLst>
-            </p:seq>
-          </p:childTnLst>
-        </p:cTn>
-      </p:par>
-    </p:tnLst>
-    <p:bldLst>
-      <p:bldP spid="3" grpId="0" build="p"/>
-    </p:bldLst>
-  </p:timing>
 </p:sld>
 </file>
 
@@ -8550,6 +7130,56 @@
           </a:p>
         </p:txBody>
       </p:sp>
+      <p:sp>
+        <p:nvSpPr>
+          <p:cNvPr id="3" name="Cloud Callout 2">
+            <a:extLst>
+              <a:ext uri="{FF2B5EF4-FFF2-40B4-BE49-F238E27FC236}">
+                <a16:creationId xmlns:a16="http://schemas.microsoft.com/office/drawing/2014/main" id="{EE946ECB-4087-FC4B-AE66-72E58087C844}"/>
+              </a:ext>
+            </a:extLst>
+          </p:cNvPr>
+          <p:cNvSpPr/>
+          <p:nvPr/>
+        </p:nvSpPr>
+        <p:spPr>
+          <a:xfrm>
+            <a:off x="8248032" y="1740310"/>
+            <a:ext cx="3865310" cy="2556387"/>
+          </a:xfrm>
+          <a:prstGeom prst="cloudCallout">
+            <a:avLst>
+              <a:gd name="adj1" fmla="val -102405"/>
+              <a:gd name="adj2" fmla="val 28190"/>
+            </a:avLst>
+          </a:prstGeom>
+        </p:spPr>
+        <p:style>
+          <a:lnRef idx="1">
+            <a:schemeClr val="accent2"/>
+          </a:lnRef>
+          <a:fillRef idx="2">
+            <a:schemeClr val="accent2"/>
+          </a:fillRef>
+          <a:effectRef idx="1">
+            <a:schemeClr val="accent2"/>
+          </a:effectRef>
+          <a:fontRef idx="minor">
+            <a:schemeClr val="dk1"/>
+          </a:fontRef>
+        </p:style>
+        <p:txBody>
+          <a:bodyPr rtlCol="0" anchor="ctr"/>
+          <a:lstStyle/>
+          <a:p>
+            <a:pPr algn="ctr"/>
+            <a:r>
+              <a:rPr lang="en-US" dirty="0"/>
+              <a:t>The aim of this channel is not to untangle you in one instance; the objective is to equip you with knowledge to untangle yourself anytime in the future!</a:t>
+            </a:r>
+          </a:p>
+        </p:txBody>
+      </p:sp>
     </p:spTree>
     <p:extLst>
       <p:ext uri="{BB962C8B-B14F-4D97-AF65-F5344CB8AC3E}">
@@ -8560,13 +7190,13 @@
   <p:clrMapOvr>
     <a:masterClrMapping/>
   </p:clrMapOvr>
-  <mc:AlternateContent xmlns:mc="http://schemas.openxmlformats.org/markup-compatibility/2006">
-    <mc:Choice xmlns:p14="http://schemas.microsoft.com/office/powerpoint/2010/main" Requires="p14">
+  <mc:AlternateContent xmlns:mc="http://schemas.openxmlformats.org/markup-compatibility/2006" xmlns:p14="http://schemas.microsoft.com/office/powerpoint/2010/main">
+    <mc:Choice Requires="p14">
       <p:transition spd="slow" p14:dur="1600">
         <p14:conveyor dir="l"/>
       </p:transition>
     </mc:Choice>
-    <mc:Fallback>
+    <mc:Fallback xmlns="">
       <p:transition spd="slow">
         <p:fade/>
       </p:transition>
@@ -8619,6 +7249,87 @@
                                   </p:childTnLst>
                                 </p:cTn>
                               </p:par>
+                              <p:par>
+                                <p:cTn id="7" presetID="55" presetClass="entr" presetSubtype="0" fill="hold" grpId="0" nodeType="withEffect">
+                                  <p:stCondLst>
+                                    <p:cond delay="0"/>
+                                  </p:stCondLst>
+                                  <p:childTnLst>
+                                    <p:set>
+                                      <p:cBhvr>
+                                        <p:cTn id="8" dur="1" fill="hold">
+                                          <p:stCondLst>
+                                            <p:cond delay="0"/>
+                                          </p:stCondLst>
+                                        </p:cTn>
+                                        <p:tgtEl>
+                                          <p:spTgt spid="3"/>
+                                        </p:tgtEl>
+                                        <p:attrNameLst>
+                                          <p:attrName>style.visibility</p:attrName>
+                                        </p:attrNameLst>
+                                      </p:cBhvr>
+                                      <p:to>
+                                        <p:strVal val="visible"/>
+                                      </p:to>
+                                    </p:set>
+                                    <p:anim calcmode="lin" valueType="num">
+                                      <p:cBhvr>
+                                        <p:cTn id="9" dur="1000" fill="hold"/>
+                                        <p:tgtEl>
+                                          <p:spTgt spid="3"/>
+                                        </p:tgtEl>
+                                        <p:attrNameLst>
+                                          <p:attrName>ppt_w</p:attrName>
+                                        </p:attrNameLst>
+                                      </p:cBhvr>
+                                      <p:tavLst>
+                                        <p:tav tm="0">
+                                          <p:val>
+                                            <p:strVal val="#ppt_w*0.70"/>
+                                          </p:val>
+                                        </p:tav>
+                                        <p:tav tm="100000">
+                                          <p:val>
+                                            <p:strVal val="#ppt_w"/>
+                                          </p:val>
+                                        </p:tav>
+                                      </p:tavLst>
+                                    </p:anim>
+                                    <p:anim calcmode="lin" valueType="num">
+                                      <p:cBhvr>
+                                        <p:cTn id="10" dur="1000" fill="hold"/>
+                                        <p:tgtEl>
+                                          <p:spTgt spid="3"/>
+                                        </p:tgtEl>
+                                        <p:attrNameLst>
+                                          <p:attrName>ppt_h</p:attrName>
+                                        </p:attrNameLst>
+                                      </p:cBhvr>
+                                      <p:tavLst>
+                                        <p:tav tm="0">
+                                          <p:val>
+                                            <p:strVal val="#ppt_h"/>
+                                          </p:val>
+                                        </p:tav>
+                                        <p:tav tm="100000">
+                                          <p:val>
+                                            <p:strVal val="#ppt_h"/>
+                                          </p:val>
+                                        </p:tav>
+                                      </p:tavLst>
+                                    </p:anim>
+                                    <p:animEffect transition="in" filter="fade">
+                                      <p:cBhvr>
+                                        <p:cTn id="11" dur="1000"/>
+                                        <p:tgtEl>
+                                          <p:spTgt spid="3"/>
+                                        </p:tgtEl>
+                                      </p:cBhvr>
+                                    </p:animEffect>
+                                  </p:childTnLst>
+                                </p:cTn>
+                              </p:par>
                             </p:childTnLst>
                           </p:cTn>
                         </p:par>
@@ -8646,6 +7357,9 @@
         </p:cTn>
       </p:par>
     </p:tnLst>
+    <p:bldLst>
+      <p:bldP spid="3" grpId="0" animBg="1"/>
+    </p:bldLst>
   </p:timing>
 </p:sld>
 </file>
@@ -8738,7 +7452,7 @@
             </a:r>
             <a:r>
               <a:rPr lang="en-US" dirty="0"/>
-              <a:t> repetition of what you can already find on the web without bringing in substantially different viewpoints about those themes.</a:t>
+              <a:t> PURE repetition of what you can already find on the web! </a:t>
             </a:r>
           </a:p>
           <a:p>
@@ -8776,13 +7490,13 @@
   <p:clrMapOvr>
     <a:masterClrMapping/>
   </p:clrMapOvr>
-  <mc:AlternateContent xmlns:mc="http://schemas.openxmlformats.org/markup-compatibility/2006">
-    <mc:Choice xmlns:p14="http://schemas.microsoft.com/office/powerpoint/2010/main" Requires="p14">
+  <mc:AlternateContent xmlns:mc="http://schemas.openxmlformats.org/markup-compatibility/2006" xmlns:p14="http://schemas.microsoft.com/office/powerpoint/2010/main">
+    <mc:Choice Requires="p14">
       <p:transition spd="slow" p14:dur="1600">
         <p14:conveyor dir="l"/>
       </p:transition>
     </mc:Choice>
-    <mc:Fallback>
+    <mc:Fallback xmlns="">
       <p:transition spd="slow">
         <p:fade/>
       </p:transition>
@@ -9423,1380 +8137,13 @@
   <p:clrMapOvr>
     <a:masterClrMapping/>
   </p:clrMapOvr>
-  <mc:AlternateContent xmlns:mc="http://schemas.openxmlformats.org/markup-compatibility/2006">
-    <mc:Choice xmlns:p14="http://schemas.microsoft.com/office/powerpoint/2010/main" Requires="p14">
+  <mc:AlternateContent xmlns:mc="http://schemas.openxmlformats.org/markup-compatibility/2006" xmlns:p14="http://schemas.microsoft.com/office/powerpoint/2010/main">
+    <mc:Choice Requires="p14">
       <p:transition spd="slow" p14:dur="1600">
         <p14:conveyor dir="l"/>
       </p:transition>
     </mc:Choice>
-    <mc:Fallback>
-      <p:transition spd="slow">
-        <p:fade/>
-      </p:transition>
-    </mc:Fallback>
-  </mc:AlternateContent>
-</p:sld>
-</file>
-
-<file path=ppt/slides/slide5.xml><?xml version="1.0" encoding="utf-8"?>
-<p:sld xmlns:a="http://schemas.openxmlformats.org/drawingml/2006/main" xmlns:r="http://schemas.openxmlformats.org/officeDocument/2006/relationships" xmlns:p="http://schemas.openxmlformats.org/presentationml/2006/main">
-  <p:cSld>
-    <p:spTree>
-      <p:nvGrpSpPr>
-        <p:cNvPr id="1" name=""/>
-        <p:cNvGrpSpPr/>
-        <p:nvPr/>
-      </p:nvGrpSpPr>
-      <p:grpSpPr>
-        <a:xfrm>
-          <a:off x="0" y="0"/>
-          <a:ext cx="0" cy="0"/>
-          <a:chOff x="0" y="0"/>
-          <a:chExt cx="0" cy="0"/>
-        </a:xfrm>
-      </p:grpSpPr>
-      <p:sp>
-        <p:nvSpPr>
-          <p:cNvPr id="2" name="Title 1">
-            <a:extLst>
-              <a:ext uri="{FF2B5EF4-FFF2-40B4-BE49-F238E27FC236}">
-                <a16:creationId xmlns:a16="http://schemas.microsoft.com/office/drawing/2014/main" id="{761CBF20-9740-764E-AB8F-F71B37485C96}"/>
-              </a:ext>
-            </a:extLst>
-          </p:cNvPr>
-          <p:cNvSpPr>
-            <a:spLocks noGrp="1"/>
-          </p:cNvSpPr>
-          <p:nvPr>
-            <p:ph type="ctrTitle"/>
-          </p:nvPr>
-        </p:nvSpPr>
-        <p:spPr/>
-        <p:txBody>
-          <a:bodyPr/>
-          <a:lstStyle/>
-          <a:p>
-            <a:r>
-              <a:rPr lang="en-GB" dirty="0"/>
-              <a:t>simple unawareness </a:t>
-            </a:r>
-            <a:br>
-              <a:rPr lang="en-GB" dirty="0"/>
-            </a:br>
-            <a:r>
-              <a:rPr lang="en-GB" dirty="0"/>
-              <a:t>leads to </a:t>
-            </a:r>
-            <a:br>
-              <a:rPr lang="en-GB" dirty="0"/>
-            </a:br>
-            <a:r>
-              <a:rPr lang="en-GB" dirty="0"/>
-              <a:t>not so simple consequences</a:t>
-            </a:r>
-            <a:endParaRPr lang="en-RS"/>
-          </a:p>
-        </p:txBody>
-      </p:sp>
-      <p:sp>
-        <p:nvSpPr>
-          <p:cNvPr id="3" name="Subtitle 2">
-            <a:extLst>
-              <a:ext uri="{FF2B5EF4-FFF2-40B4-BE49-F238E27FC236}">
-                <a16:creationId xmlns:a16="http://schemas.microsoft.com/office/drawing/2014/main" id="{901E7A5B-7247-254D-BE60-2DEDCAA80163}"/>
-              </a:ext>
-            </a:extLst>
-          </p:cNvPr>
-          <p:cNvSpPr>
-            <a:spLocks noGrp="1"/>
-          </p:cNvSpPr>
-          <p:nvPr>
-            <p:ph type="subTitle" idx="1"/>
-          </p:nvPr>
-        </p:nvSpPr>
-        <p:spPr/>
-        <p:txBody>
-          <a:bodyPr/>
-          <a:lstStyle/>
-          <a:p>
-            <a:r>
-              <a:rPr lang="en-RS"/>
-              <a:t>Story about caches and memory leaks</a:t>
-            </a:r>
-          </a:p>
-        </p:txBody>
-      </p:sp>
-    </p:spTree>
-    <p:extLst>
-      <p:ext uri="{BB962C8B-B14F-4D97-AF65-F5344CB8AC3E}">
-        <p14:creationId xmlns:p14="http://schemas.microsoft.com/office/powerpoint/2010/main" val="1004353519"/>
-      </p:ext>
-    </p:extLst>
-  </p:cSld>
-  <p:clrMapOvr>
-    <a:masterClrMapping/>
-  </p:clrMapOvr>
-  <mc:AlternateContent xmlns:mc="http://schemas.openxmlformats.org/markup-compatibility/2006">
-    <mc:Choice xmlns:p14="http://schemas.microsoft.com/office/powerpoint/2010/main" Requires="p14">
-      <p:transition spd="slow" p14:dur="1600">
-        <p14:conveyor dir="l"/>
-      </p:transition>
-    </mc:Choice>
-    <mc:Fallback>
-      <p:transition spd="slow">
-        <p:fade/>
-      </p:transition>
-    </mc:Fallback>
-  </mc:AlternateContent>
-</p:sld>
-</file>
-
-<file path=ppt/slides/slide6.xml><?xml version="1.0" encoding="utf-8"?>
-<p:sld xmlns:a="http://schemas.openxmlformats.org/drawingml/2006/main" xmlns:r="http://schemas.openxmlformats.org/officeDocument/2006/relationships" xmlns:p="http://schemas.openxmlformats.org/presentationml/2006/main">
-  <p:cSld>
-    <p:spTree>
-      <p:nvGrpSpPr>
-        <p:cNvPr id="1" name=""/>
-        <p:cNvGrpSpPr/>
-        <p:nvPr/>
-      </p:nvGrpSpPr>
-      <p:grpSpPr>
-        <a:xfrm>
-          <a:off x="0" y="0"/>
-          <a:ext cx="0" cy="0"/>
-          <a:chOff x="0" y="0"/>
-          <a:chExt cx="0" cy="0"/>
-        </a:xfrm>
-      </p:grpSpPr>
-      <p:sp>
-        <p:nvSpPr>
-          <p:cNvPr id="2" name="Title 1">
-            <a:extLst>
-              <a:ext uri="{FF2B5EF4-FFF2-40B4-BE49-F238E27FC236}">
-                <a16:creationId xmlns:a16="http://schemas.microsoft.com/office/drawing/2014/main" id="{73029F44-0BDC-1B4E-9EA9-6A0355FB86FF}"/>
-              </a:ext>
-            </a:extLst>
-          </p:cNvPr>
-          <p:cNvSpPr>
-            <a:spLocks noGrp="1"/>
-          </p:cNvSpPr>
-          <p:nvPr>
-            <p:ph type="title"/>
-          </p:nvPr>
-        </p:nvSpPr>
-        <p:spPr/>
-        <p:txBody>
-          <a:bodyPr/>
-          <a:lstStyle/>
-          <a:p>
-            <a:r>
-              <a:rPr lang="en-RS"/>
-              <a:t>abstract</a:t>
-            </a:r>
-          </a:p>
-        </p:txBody>
-      </p:sp>
-      <p:sp>
-        <p:nvSpPr>
-          <p:cNvPr id="4" name="TextBox 3">
-            <a:extLst>
-              <a:ext uri="{FF2B5EF4-FFF2-40B4-BE49-F238E27FC236}">
-                <a16:creationId xmlns:a16="http://schemas.microsoft.com/office/drawing/2014/main" id="{BE2A1020-4D90-B848-97FE-FE931DD554F5}"/>
-              </a:ext>
-            </a:extLst>
-          </p:cNvPr>
-          <p:cNvSpPr txBox="1"/>
-          <p:nvPr/>
-        </p:nvSpPr>
-        <p:spPr>
-          <a:xfrm>
-            <a:off x="1317523" y="2214694"/>
-            <a:ext cx="9497961" cy="2862322"/>
-          </a:xfrm>
-          <a:prstGeom prst="rect">
-            <a:avLst/>
-          </a:prstGeom>
-          <a:noFill/>
-        </p:spPr>
-        <p:txBody>
-          <a:bodyPr wrap="square" rtlCol="0">
-            <a:spAutoFit/>
-          </a:bodyPr>
-          <a:lstStyle/>
-          <a:p>
-            <a:pPr algn="just"/>
-            <a:r>
-              <a:rPr lang="en-RS" dirty="0"/>
-              <a:t>In the old days of computing, for example, when I had worked on my </a:t>
-            </a:r>
-            <a:r>
-              <a:rPr lang="en-RS" dirty="0">
-                <a:hlinkClick r:id="rId2"/>
-              </a:rPr>
-              <a:t>Sinclair ZX Spectrum 48K</a:t>
-            </a:r>
-            <a:r>
-              <a:rPr lang="en-RS" dirty="0"/>
-              <a:t> in Z80 assembly, there was an intimate relationship between software and hardware. A software engineer had deep knowledge about the underlying mechanisms of a computer system. This has changed tremendously; just think about the shift toward serverless computing. Today most software people don’t even understand the memory layout of a computer let alone write programs in assembly language.</a:t>
-            </a:r>
-          </a:p>
-          <a:p>
-            <a:pPr algn="just"/>
-            <a:endParaRPr lang="en-RS" dirty="0"/>
-          </a:p>
-          <a:p>
-            <a:pPr algn="just"/>
-            <a:r>
-              <a:rPr lang="en-GB" dirty="0"/>
-              <a:t>Modern programming languages try to make things simple by hiding details. IDEs autogenerate lots of boilerplate code reducing manual work and opportunity for bugs. Nevertheless, ignoring how things work in the background may lead to unwanted surprises and hard debugging sessions. This video is a story about why it is important to be knowledgeable about things happening under the hood.</a:t>
-            </a:r>
-            <a:endParaRPr lang="en-RS" dirty="0"/>
-          </a:p>
-        </p:txBody>
-      </p:sp>
-    </p:spTree>
-    <p:extLst>
-      <p:ext uri="{BB962C8B-B14F-4D97-AF65-F5344CB8AC3E}">
-        <p14:creationId xmlns:p14="http://schemas.microsoft.com/office/powerpoint/2010/main" val="91101553"/>
-      </p:ext>
-    </p:extLst>
-  </p:cSld>
-  <p:clrMapOvr>
-    <a:masterClrMapping/>
-  </p:clrMapOvr>
-  <mc:AlternateContent xmlns:mc="http://schemas.openxmlformats.org/markup-compatibility/2006">
-    <mc:Choice xmlns:p14="http://schemas.microsoft.com/office/powerpoint/2010/main" Requires="p14">
-      <p:transition spd="slow" p14:dur="1600">
-        <p14:conveyor dir="l"/>
-      </p:transition>
-    </mc:Choice>
-    <mc:Fallback>
-      <p:transition spd="slow">
-        <p:fade/>
-      </p:transition>
-    </mc:Fallback>
-  </mc:AlternateContent>
-</p:sld>
-</file>
-
-<file path=ppt/slides/slide7.xml><?xml version="1.0" encoding="utf-8"?>
-<p:sld xmlns:a="http://schemas.openxmlformats.org/drawingml/2006/main" xmlns:r="http://schemas.openxmlformats.org/officeDocument/2006/relationships" xmlns:p="http://schemas.openxmlformats.org/presentationml/2006/main">
-  <p:cSld>
-    <p:spTree>
-      <p:nvGrpSpPr>
-        <p:cNvPr id="1" name=""/>
-        <p:cNvGrpSpPr/>
-        <p:nvPr/>
-      </p:nvGrpSpPr>
-      <p:grpSpPr>
-        <a:xfrm>
-          <a:off x="0" y="0"/>
-          <a:ext cx="0" cy="0"/>
-          <a:chOff x="0" y="0"/>
-          <a:chExt cx="0" cy="0"/>
-        </a:xfrm>
-      </p:grpSpPr>
-      <p:sp>
-        <p:nvSpPr>
-          <p:cNvPr id="2" name="Title 1">
-            <a:extLst>
-              <a:ext uri="{FF2B5EF4-FFF2-40B4-BE49-F238E27FC236}">
-                <a16:creationId xmlns:a16="http://schemas.microsoft.com/office/drawing/2014/main" id="{7A92B621-A7C7-724D-820E-A4FE7161AD11}"/>
-              </a:ext>
-            </a:extLst>
-          </p:cNvPr>
-          <p:cNvSpPr>
-            <a:spLocks noGrp="1"/>
-          </p:cNvSpPr>
-          <p:nvPr>
-            <p:ph type="title"/>
-          </p:nvPr>
-        </p:nvSpPr>
-        <p:spPr/>
-        <p:txBody>
-          <a:bodyPr/>
-          <a:lstStyle/>
-          <a:p>
-            <a:r>
-              <a:rPr lang="en-RS" dirty="0"/>
-              <a:t>Table of contents</a:t>
-            </a:r>
-          </a:p>
-        </p:txBody>
-      </p:sp>
-      <p:sp>
-        <p:nvSpPr>
-          <p:cNvPr id="3" name="Content Placeholder 2">
-            <a:extLst>
-              <a:ext uri="{FF2B5EF4-FFF2-40B4-BE49-F238E27FC236}">
-                <a16:creationId xmlns:a16="http://schemas.microsoft.com/office/drawing/2014/main" id="{D2B57F95-E21B-0C4F-8750-26293B05C510}"/>
-              </a:ext>
-            </a:extLst>
-          </p:cNvPr>
-          <p:cNvSpPr>
-            <a:spLocks noGrp="1"/>
-          </p:cNvSpPr>
-          <p:nvPr>
-            <p:ph sz="quarter" idx="13"/>
-          </p:nvPr>
-        </p:nvSpPr>
-        <p:spPr/>
-        <p:txBody>
-          <a:bodyPr/>
-          <a:lstStyle/>
-          <a:p>
-            <a:pPr marL="457200" indent="-457200">
-              <a:buFont typeface="+mj-lt"/>
-              <a:buAutoNum type="arabicPeriod"/>
-            </a:pPr>
-            <a:r>
-              <a:rPr lang="en-US" dirty="0"/>
-              <a:t>Description of our use case</a:t>
-            </a:r>
-          </a:p>
-          <a:p>
-            <a:pPr marL="457200" indent="-457200">
-              <a:buFont typeface="+mj-lt"/>
-              <a:buAutoNum type="arabicPeriod"/>
-            </a:pPr>
-            <a:r>
-              <a:rPr lang="en-US" dirty="0"/>
-              <a:t>The need for caching and memoization</a:t>
-            </a:r>
-          </a:p>
-          <a:p>
-            <a:pPr marL="457200" indent="-457200">
-              <a:buFont typeface="+mj-lt"/>
-              <a:buAutoNum type="arabicPeriod"/>
-            </a:pPr>
-            <a:r>
-              <a:rPr lang="en-US" dirty="0"/>
-              <a:t>Differences between cold and warm (hot) caches</a:t>
-            </a:r>
-          </a:p>
-          <a:p>
-            <a:pPr marL="457200" indent="-457200">
-              <a:buFont typeface="+mj-lt"/>
-              <a:buAutoNum type="arabicPeriod"/>
-            </a:pPr>
-            <a:r>
-              <a:rPr lang="en-US" dirty="0"/>
-              <a:t>Built-in support for memoization exemplified in python 3.9</a:t>
-            </a:r>
-          </a:p>
-          <a:p>
-            <a:pPr marL="457200" indent="-457200">
-              <a:buFont typeface="+mj-lt"/>
-              <a:buAutoNum type="arabicPeriod"/>
-            </a:pPr>
-            <a:r>
-              <a:rPr lang="en-US" dirty="0"/>
-              <a:t>the importance of monitoring caching behavior</a:t>
-            </a:r>
-          </a:p>
-        </p:txBody>
-      </p:sp>
-    </p:spTree>
-    <p:extLst>
-      <p:ext uri="{BB962C8B-B14F-4D97-AF65-F5344CB8AC3E}">
-        <p14:creationId xmlns:p14="http://schemas.microsoft.com/office/powerpoint/2010/main" val="963138250"/>
-      </p:ext>
-    </p:extLst>
-  </p:cSld>
-  <p:clrMapOvr>
-    <a:masterClrMapping/>
-  </p:clrMapOvr>
-  <mc:AlternateContent xmlns:mc="http://schemas.openxmlformats.org/markup-compatibility/2006">
-    <mc:Choice xmlns:p14="http://schemas.microsoft.com/office/powerpoint/2010/main" Requires="p14">
-      <p:transition spd="slow" p14:dur="1600">
-        <p14:conveyor dir="l"/>
-      </p:transition>
-    </mc:Choice>
-    <mc:Fallback>
-      <p:transition spd="slow">
-        <p:fade/>
-      </p:transition>
-    </mc:Fallback>
-  </mc:AlternateContent>
-  <p:timing>
-    <p:tnLst>
-      <p:par>
-        <p:cTn id="1" dur="indefinite" restart="never" nodeType="tmRoot">
-          <p:childTnLst>
-            <p:seq concurrent="1" nextAc="seek">
-              <p:cTn id="2" dur="indefinite" nodeType="mainSeq">
-                <p:childTnLst>
-                  <p:par>
-                    <p:cTn id="3" fill="hold">
-                      <p:stCondLst>
-                        <p:cond delay="indefinite"/>
-                      </p:stCondLst>
-                      <p:childTnLst>
-                        <p:par>
-                          <p:cTn id="4" fill="hold">
-                            <p:stCondLst>
-                              <p:cond delay="0"/>
-                            </p:stCondLst>
-                            <p:childTnLst>
-                              <p:par>
-                                <p:cTn id="5" presetID="2" presetClass="entr" presetSubtype="4" fill="hold" grpId="0" nodeType="clickEffect">
-                                  <p:stCondLst>
-                                    <p:cond delay="0"/>
-                                  </p:stCondLst>
-                                  <p:childTnLst>
-                                    <p:set>
-                                      <p:cBhvr>
-                                        <p:cTn id="6" dur="1" fill="hold">
-                                          <p:stCondLst>
-                                            <p:cond delay="0"/>
-                                          </p:stCondLst>
-                                        </p:cTn>
-                                        <p:tgtEl>
-                                          <p:spTgt spid="3">
-                                            <p:txEl>
-                                              <p:pRg st="0" end="0"/>
-                                            </p:txEl>
-                                          </p:spTgt>
-                                        </p:tgtEl>
-                                        <p:attrNameLst>
-                                          <p:attrName>style.visibility</p:attrName>
-                                        </p:attrNameLst>
-                                      </p:cBhvr>
-                                      <p:to>
-                                        <p:strVal val="visible"/>
-                                      </p:to>
-                                    </p:set>
-                                    <p:anim calcmode="lin" valueType="num">
-                                      <p:cBhvr additive="base">
-                                        <p:cTn id="7" dur="500" fill="hold"/>
-                                        <p:tgtEl>
-                                          <p:spTgt spid="3">
-                                            <p:txEl>
-                                              <p:pRg st="0" end="0"/>
-                                            </p:txEl>
-                                          </p:spTgt>
-                                        </p:tgtEl>
-                                        <p:attrNameLst>
-                                          <p:attrName>ppt_x</p:attrName>
-                                        </p:attrNameLst>
-                                      </p:cBhvr>
-                                      <p:tavLst>
-                                        <p:tav tm="0">
-                                          <p:val>
-                                            <p:strVal val="#ppt_x"/>
-                                          </p:val>
-                                        </p:tav>
-                                        <p:tav tm="100000">
-                                          <p:val>
-                                            <p:strVal val="#ppt_x"/>
-                                          </p:val>
-                                        </p:tav>
-                                      </p:tavLst>
-                                    </p:anim>
-                                    <p:anim calcmode="lin" valueType="num">
-                                      <p:cBhvr additive="base">
-                                        <p:cTn id="8" dur="500" fill="hold"/>
-                                        <p:tgtEl>
-                                          <p:spTgt spid="3">
-                                            <p:txEl>
-                                              <p:pRg st="0" end="0"/>
-                                            </p:txEl>
-                                          </p:spTgt>
-                                        </p:tgtEl>
-                                        <p:attrNameLst>
-                                          <p:attrName>ppt_y</p:attrName>
-                                        </p:attrNameLst>
-                                      </p:cBhvr>
-                                      <p:tavLst>
-                                        <p:tav tm="0">
-                                          <p:val>
-                                            <p:strVal val="1+#ppt_h/2"/>
-                                          </p:val>
-                                        </p:tav>
-                                        <p:tav tm="100000">
-                                          <p:val>
-                                            <p:strVal val="#ppt_y"/>
-                                          </p:val>
-                                        </p:tav>
-                                      </p:tavLst>
-                                    </p:anim>
-                                  </p:childTnLst>
-                                </p:cTn>
-                              </p:par>
-                            </p:childTnLst>
-                          </p:cTn>
-                        </p:par>
-                      </p:childTnLst>
-                    </p:cTn>
-                  </p:par>
-                  <p:par>
-                    <p:cTn id="9" fill="hold">
-                      <p:stCondLst>
-                        <p:cond delay="indefinite"/>
-                      </p:stCondLst>
-                      <p:childTnLst>
-                        <p:par>
-                          <p:cTn id="10" fill="hold">
-                            <p:stCondLst>
-                              <p:cond delay="0"/>
-                            </p:stCondLst>
-                            <p:childTnLst>
-                              <p:par>
-                                <p:cTn id="11" presetID="2" presetClass="entr" presetSubtype="4" fill="hold" grpId="0" nodeType="clickEffect">
-                                  <p:stCondLst>
-                                    <p:cond delay="0"/>
-                                  </p:stCondLst>
-                                  <p:childTnLst>
-                                    <p:set>
-                                      <p:cBhvr>
-                                        <p:cTn id="12" dur="1" fill="hold">
-                                          <p:stCondLst>
-                                            <p:cond delay="0"/>
-                                          </p:stCondLst>
-                                        </p:cTn>
-                                        <p:tgtEl>
-                                          <p:spTgt spid="3">
-                                            <p:txEl>
-                                              <p:pRg st="1" end="1"/>
-                                            </p:txEl>
-                                          </p:spTgt>
-                                        </p:tgtEl>
-                                        <p:attrNameLst>
-                                          <p:attrName>style.visibility</p:attrName>
-                                        </p:attrNameLst>
-                                      </p:cBhvr>
-                                      <p:to>
-                                        <p:strVal val="visible"/>
-                                      </p:to>
-                                    </p:set>
-                                    <p:anim calcmode="lin" valueType="num">
-                                      <p:cBhvr additive="base">
-                                        <p:cTn id="13" dur="500" fill="hold"/>
-                                        <p:tgtEl>
-                                          <p:spTgt spid="3">
-                                            <p:txEl>
-                                              <p:pRg st="1" end="1"/>
-                                            </p:txEl>
-                                          </p:spTgt>
-                                        </p:tgtEl>
-                                        <p:attrNameLst>
-                                          <p:attrName>ppt_x</p:attrName>
-                                        </p:attrNameLst>
-                                      </p:cBhvr>
-                                      <p:tavLst>
-                                        <p:tav tm="0">
-                                          <p:val>
-                                            <p:strVal val="#ppt_x"/>
-                                          </p:val>
-                                        </p:tav>
-                                        <p:tav tm="100000">
-                                          <p:val>
-                                            <p:strVal val="#ppt_x"/>
-                                          </p:val>
-                                        </p:tav>
-                                      </p:tavLst>
-                                    </p:anim>
-                                    <p:anim calcmode="lin" valueType="num">
-                                      <p:cBhvr additive="base">
-                                        <p:cTn id="14" dur="500" fill="hold"/>
-                                        <p:tgtEl>
-                                          <p:spTgt spid="3">
-                                            <p:txEl>
-                                              <p:pRg st="1" end="1"/>
-                                            </p:txEl>
-                                          </p:spTgt>
-                                        </p:tgtEl>
-                                        <p:attrNameLst>
-                                          <p:attrName>ppt_y</p:attrName>
-                                        </p:attrNameLst>
-                                      </p:cBhvr>
-                                      <p:tavLst>
-                                        <p:tav tm="0">
-                                          <p:val>
-                                            <p:strVal val="1+#ppt_h/2"/>
-                                          </p:val>
-                                        </p:tav>
-                                        <p:tav tm="100000">
-                                          <p:val>
-                                            <p:strVal val="#ppt_y"/>
-                                          </p:val>
-                                        </p:tav>
-                                      </p:tavLst>
-                                    </p:anim>
-                                  </p:childTnLst>
-                                </p:cTn>
-                              </p:par>
-                            </p:childTnLst>
-                          </p:cTn>
-                        </p:par>
-                      </p:childTnLst>
-                    </p:cTn>
-                  </p:par>
-                  <p:par>
-                    <p:cTn id="15" fill="hold">
-                      <p:stCondLst>
-                        <p:cond delay="indefinite"/>
-                      </p:stCondLst>
-                      <p:childTnLst>
-                        <p:par>
-                          <p:cTn id="16" fill="hold">
-                            <p:stCondLst>
-                              <p:cond delay="0"/>
-                            </p:stCondLst>
-                            <p:childTnLst>
-                              <p:par>
-                                <p:cTn id="17" presetID="2" presetClass="entr" presetSubtype="4" fill="hold" grpId="0" nodeType="clickEffect">
-                                  <p:stCondLst>
-                                    <p:cond delay="0"/>
-                                  </p:stCondLst>
-                                  <p:childTnLst>
-                                    <p:set>
-                                      <p:cBhvr>
-                                        <p:cTn id="18" dur="1" fill="hold">
-                                          <p:stCondLst>
-                                            <p:cond delay="0"/>
-                                          </p:stCondLst>
-                                        </p:cTn>
-                                        <p:tgtEl>
-                                          <p:spTgt spid="3">
-                                            <p:txEl>
-                                              <p:pRg st="2" end="2"/>
-                                            </p:txEl>
-                                          </p:spTgt>
-                                        </p:tgtEl>
-                                        <p:attrNameLst>
-                                          <p:attrName>style.visibility</p:attrName>
-                                        </p:attrNameLst>
-                                      </p:cBhvr>
-                                      <p:to>
-                                        <p:strVal val="visible"/>
-                                      </p:to>
-                                    </p:set>
-                                    <p:anim calcmode="lin" valueType="num">
-                                      <p:cBhvr additive="base">
-                                        <p:cTn id="19" dur="500" fill="hold"/>
-                                        <p:tgtEl>
-                                          <p:spTgt spid="3">
-                                            <p:txEl>
-                                              <p:pRg st="2" end="2"/>
-                                            </p:txEl>
-                                          </p:spTgt>
-                                        </p:tgtEl>
-                                        <p:attrNameLst>
-                                          <p:attrName>ppt_x</p:attrName>
-                                        </p:attrNameLst>
-                                      </p:cBhvr>
-                                      <p:tavLst>
-                                        <p:tav tm="0">
-                                          <p:val>
-                                            <p:strVal val="#ppt_x"/>
-                                          </p:val>
-                                        </p:tav>
-                                        <p:tav tm="100000">
-                                          <p:val>
-                                            <p:strVal val="#ppt_x"/>
-                                          </p:val>
-                                        </p:tav>
-                                      </p:tavLst>
-                                    </p:anim>
-                                    <p:anim calcmode="lin" valueType="num">
-                                      <p:cBhvr additive="base">
-                                        <p:cTn id="20" dur="500" fill="hold"/>
-                                        <p:tgtEl>
-                                          <p:spTgt spid="3">
-                                            <p:txEl>
-                                              <p:pRg st="2" end="2"/>
-                                            </p:txEl>
-                                          </p:spTgt>
-                                        </p:tgtEl>
-                                        <p:attrNameLst>
-                                          <p:attrName>ppt_y</p:attrName>
-                                        </p:attrNameLst>
-                                      </p:cBhvr>
-                                      <p:tavLst>
-                                        <p:tav tm="0">
-                                          <p:val>
-                                            <p:strVal val="1+#ppt_h/2"/>
-                                          </p:val>
-                                        </p:tav>
-                                        <p:tav tm="100000">
-                                          <p:val>
-                                            <p:strVal val="#ppt_y"/>
-                                          </p:val>
-                                        </p:tav>
-                                      </p:tavLst>
-                                    </p:anim>
-                                  </p:childTnLst>
-                                </p:cTn>
-                              </p:par>
-                            </p:childTnLst>
-                          </p:cTn>
-                        </p:par>
-                      </p:childTnLst>
-                    </p:cTn>
-                  </p:par>
-                  <p:par>
-                    <p:cTn id="21" fill="hold">
-                      <p:stCondLst>
-                        <p:cond delay="indefinite"/>
-                      </p:stCondLst>
-                      <p:childTnLst>
-                        <p:par>
-                          <p:cTn id="22" fill="hold">
-                            <p:stCondLst>
-                              <p:cond delay="0"/>
-                            </p:stCondLst>
-                            <p:childTnLst>
-                              <p:par>
-                                <p:cTn id="23" presetID="2" presetClass="entr" presetSubtype="4" fill="hold" grpId="0" nodeType="clickEffect">
-                                  <p:stCondLst>
-                                    <p:cond delay="0"/>
-                                  </p:stCondLst>
-                                  <p:childTnLst>
-                                    <p:set>
-                                      <p:cBhvr>
-                                        <p:cTn id="24" dur="1" fill="hold">
-                                          <p:stCondLst>
-                                            <p:cond delay="0"/>
-                                          </p:stCondLst>
-                                        </p:cTn>
-                                        <p:tgtEl>
-                                          <p:spTgt spid="3">
-                                            <p:txEl>
-                                              <p:pRg st="3" end="3"/>
-                                            </p:txEl>
-                                          </p:spTgt>
-                                        </p:tgtEl>
-                                        <p:attrNameLst>
-                                          <p:attrName>style.visibility</p:attrName>
-                                        </p:attrNameLst>
-                                      </p:cBhvr>
-                                      <p:to>
-                                        <p:strVal val="visible"/>
-                                      </p:to>
-                                    </p:set>
-                                    <p:anim calcmode="lin" valueType="num">
-                                      <p:cBhvr additive="base">
-                                        <p:cTn id="25" dur="500" fill="hold"/>
-                                        <p:tgtEl>
-                                          <p:spTgt spid="3">
-                                            <p:txEl>
-                                              <p:pRg st="3" end="3"/>
-                                            </p:txEl>
-                                          </p:spTgt>
-                                        </p:tgtEl>
-                                        <p:attrNameLst>
-                                          <p:attrName>ppt_x</p:attrName>
-                                        </p:attrNameLst>
-                                      </p:cBhvr>
-                                      <p:tavLst>
-                                        <p:tav tm="0">
-                                          <p:val>
-                                            <p:strVal val="#ppt_x"/>
-                                          </p:val>
-                                        </p:tav>
-                                        <p:tav tm="100000">
-                                          <p:val>
-                                            <p:strVal val="#ppt_x"/>
-                                          </p:val>
-                                        </p:tav>
-                                      </p:tavLst>
-                                    </p:anim>
-                                    <p:anim calcmode="lin" valueType="num">
-                                      <p:cBhvr additive="base">
-                                        <p:cTn id="26" dur="500" fill="hold"/>
-                                        <p:tgtEl>
-                                          <p:spTgt spid="3">
-                                            <p:txEl>
-                                              <p:pRg st="3" end="3"/>
-                                            </p:txEl>
-                                          </p:spTgt>
-                                        </p:tgtEl>
-                                        <p:attrNameLst>
-                                          <p:attrName>ppt_y</p:attrName>
-                                        </p:attrNameLst>
-                                      </p:cBhvr>
-                                      <p:tavLst>
-                                        <p:tav tm="0">
-                                          <p:val>
-                                            <p:strVal val="1+#ppt_h/2"/>
-                                          </p:val>
-                                        </p:tav>
-                                        <p:tav tm="100000">
-                                          <p:val>
-                                            <p:strVal val="#ppt_y"/>
-                                          </p:val>
-                                        </p:tav>
-                                      </p:tavLst>
-                                    </p:anim>
-                                  </p:childTnLst>
-                                </p:cTn>
-                              </p:par>
-                            </p:childTnLst>
-                          </p:cTn>
-                        </p:par>
-                      </p:childTnLst>
-                    </p:cTn>
-                  </p:par>
-                  <p:par>
-                    <p:cTn id="27" fill="hold">
-                      <p:stCondLst>
-                        <p:cond delay="indefinite"/>
-                      </p:stCondLst>
-                      <p:childTnLst>
-                        <p:par>
-                          <p:cTn id="28" fill="hold">
-                            <p:stCondLst>
-                              <p:cond delay="0"/>
-                            </p:stCondLst>
-                            <p:childTnLst>
-                              <p:par>
-                                <p:cTn id="29" presetID="2" presetClass="entr" presetSubtype="4" fill="hold" grpId="0" nodeType="clickEffect">
-                                  <p:stCondLst>
-                                    <p:cond delay="0"/>
-                                  </p:stCondLst>
-                                  <p:childTnLst>
-                                    <p:set>
-                                      <p:cBhvr>
-                                        <p:cTn id="30" dur="1" fill="hold">
-                                          <p:stCondLst>
-                                            <p:cond delay="0"/>
-                                          </p:stCondLst>
-                                        </p:cTn>
-                                        <p:tgtEl>
-                                          <p:spTgt spid="3">
-                                            <p:txEl>
-                                              <p:pRg st="4" end="4"/>
-                                            </p:txEl>
-                                          </p:spTgt>
-                                        </p:tgtEl>
-                                        <p:attrNameLst>
-                                          <p:attrName>style.visibility</p:attrName>
-                                        </p:attrNameLst>
-                                      </p:cBhvr>
-                                      <p:to>
-                                        <p:strVal val="visible"/>
-                                      </p:to>
-                                    </p:set>
-                                    <p:anim calcmode="lin" valueType="num">
-                                      <p:cBhvr additive="base">
-                                        <p:cTn id="31" dur="500" fill="hold"/>
-                                        <p:tgtEl>
-                                          <p:spTgt spid="3">
-                                            <p:txEl>
-                                              <p:pRg st="4" end="4"/>
-                                            </p:txEl>
-                                          </p:spTgt>
-                                        </p:tgtEl>
-                                        <p:attrNameLst>
-                                          <p:attrName>ppt_x</p:attrName>
-                                        </p:attrNameLst>
-                                      </p:cBhvr>
-                                      <p:tavLst>
-                                        <p:tav tm="0">
-                                          <p:val>
-                                            <p:strVal val="#ppt_x"/>
-                                          </p:val>
-                                        </p:tav>
-                                        <p:tav tm="100000">
-                                          <p:val>
-                                            <p:strVal val="#ppt_x"/>
-                                          </p:val>
-                                        </p:tav>
-                                      </p:tavLst>
-                                    </p:anim>
-                                    <p:anim calcmode="lin" valueType="num">
-                                      <p:cBhvr additive="base">
-                                        <p:cTn id="32" dur="500" fill="hold"/>
-                                        <p:tgtEl>
-                                          <p:spTgt spid="3">
-                                            <p:txEl>
-                                              <p:pRg st="4" end="4"/>
-                                            </p:txEl>
-                                          </p:spTgt>
-                                        </p:tgtEl>
-                                        <p:attrNameLst>
-                                          <p:attrName>ppt_y</p:attrName>
-                                        </p:attrNameLst>
-                                      </p:cBhvr>
-                                      <p:tavLst>
-                                        <p:tav tm="0">
-                                          <p:val>
-                                            <p:strVal val="1+#ppt_h/2"/>
-                                          </p:val>
-                                        </p:tav>
-                                        <p:tav tm="100000">
-                                          <p:val>
-                                            <p:strVal val="#ppt_y"/>
-                                          </p:val>
-                                        </p:tav>
-                                      </p:tavLst>
-                                    </p:anim>
-                                  </p:childTnLst>
-                                </p:cTn>
-                              </p:par>
-                            </p:childTnLst>
-                          </p:cTn>
-                        </p:par>
-                      </p:childTnLst>
-                    </p:cTn>
-                  </p:par>
-                </p:childTnLst>
-              </p:cTn>
-              <p:prevCondLst>
-                <p:cond evt="onPrev" delay="0">
-                  <p:tgtEl>
-                    <p:sldTgt/>
-                  </p:tgtEl>
-                </p:cond>
-              </p:prevCondLst>
-              <p:nextCondLst>
-                <p:cond evt="onNext" delay="0">
-                  <p:tgtEl>
-                    <p:sldTgt/>
-                  </p:tgtEl>
-                </p:cond>
-              </p:nextCondLst>
-            </p:seq>
-          </p:childTnLst>
-        </p:cTn>
-      </p:par>
-    </p:tnLst>
-    <p:bldLst>
-      <p:bldP spid="3" grpId="0" build="p"/>
-    </p:bldLst>
-  </p:timing>
-</p:sld>
-</file>
-
-<file path=ppt/slides/slide8.xml><?xml version="1.0" encoding="utf-8"?>
-<p:sld xmlns:a="http://schemas.openxmlformats.org/drawingml/2006/main" xmlns:r="http://schemas.openxmlformats.org/officeDocument/2006/relationships" xmlns:p="http://schemas.openxmlformats.org/presentationml/2006/main">
-  <p:cSld>
-    <p:spTree>
-      <p:nvGrpSpPr>
-        <p:cNvPr id="1" name=""/>
-        <p:cNvGrpSpPr/>
-        <p:nvPr/>
-      </p:nvGrpSpPr>
-      <p:grpSpPr>
-        <a:xfrm>
-          <a:off x="0" y="0"/>
-          <a:ext cx="0" cy="0"/>
-          <a:chOff x="0" y="0"/>
-          <a:chExt cx="0" cy="0"/>
-        </a:xfrm>
-      </p:grpSpPr>
-      <p:sp>
-        <p:nvSpPr>
-          <p:cNvPr id="2" name="Title 1">
-            <a:extLst>
-              <a:ext uri="{FF2B5EF4-FFF2-40B4-BE49-F238E27FC236}">
-                <a16:creationId xmlns:a16="http://schemas.microsoft.com/office/drawing/2014/main" id="{A12BE8DB-8003-7F43-BBB8-232948D3369A}"/>
-              </a:ext>
-            </a:extLst>
-          </p:cNvPr>
-          <p:cNvSpPr>
-            <a:spLocks noGrp="1"/>
-          </p:cNvSpPr>
-          <p:nvPr>
-            <p:ph type="title"/>
-          </p:nvPr>
-        </p:nvSpPr>
-        <p:spPr/>
-        <p:txBody>
-          <a:bodyPr/>
-          <a:lstStyle/>
-          <a:p>
-            <a:r>
-              <a:rPr lang="en-US" dirty="0"/>
-              <a:t>Problem description</a:t>
-            </a:r>
-          </a:p>
-        </p:txBody>
-      </p:sp>
-      <p:sp>
-        <p:nvSpPr>
-          <p:cNvPr id="3" name="Content Placeholder 2">
-            <a:extLst>
-              <a:ext uri="{FF2B5EF4-FFF2-40B4-BE49-F238E27FC236}">
-                <a16:creationId xmlns:a16="http://schemas.microsoft.com/office/drawing/2014/main" id="{4540D3A0-B9CE-654F-854A-DCB7591EE15C}"/>
-              </a:ext>
-            </a:extLst>
-          </p:cNvPr>
-          <p:cNvSpPr>
-            <a:spLocks noGrp="1"/>
-          </p:cNvSpPr>
-          <p:nvPr>
-            <p:ph sz="quarter" idx="13"/>
-          </p:nvPr>
-        </p:nvSpPr>
-        <p:spPr/>
-        <p:txBody>
-          <a:bodyPr/>
-          <a:lstStyle/>
-          <a:p>
-            <a:pPr marL="0" indent="0">
-              <a:buNone/>
-            </a:pPr>
-            <a:r>
-              <a:rPr lang="en-US" dirty="0"/>
-              <a:t>We would like to compute the n-th </a:t>
-            </a:r>
-            <a:r>
-              <a:rPr lang="en-US" dirty="0">
-                <a:hlinkClick r:id="rId2"/>
-              </a:rPr>
-              <a:t>fibonacci number</a:t>
-            </a:r>
-            <a:r>
-              <a:rPr lang="en-US" dirty="0"/>
-              <a:t> and output both its value as well as number of steps taken to calculate it. Think of the latter as the number of times we’ve recalculated the same inner component. We will implement this task in python 3.9+.</a:t>
-            </a:r>
-          </a:p>
-          <a:p>
-            <a:pPr marL="0" indent="0">
-              <a:buNone/>
-            </a:pPr>
-            <a:r>
-              <a:rPr lang="en-US" dirty="0"/>
-              <a:t>The focus will be on demonstrating the dangers pertaining to uninformed usage of seemingly simple programming elements.</a:t>
-            </a:r>
-          </a:p>
-        </p:txBody>
-      </p:sp>
-    </p:spTree>
-    <p:extLst>
-      <p:ext uri="{BB962C8B-B14F-4D97-AF65-F5344CB8AC3E}">
-        <p14:creationId xmlns:p14="http://schemas.microsoft.com/office/powerpoint/2010/main" val="2212754017"/>
-      </p:ext>
-    </p:extLst>
-  </p:cSld>
-  <p:clrMapOvr>
-    <a:masterClrMapping/>
-  </p:clrMapOvr>
-  <mc:AlternateContent xmlns:mc="http://schemas.openxmlformats.org/markup-compatibility/2006">
-    <mc:Choice xmlns:p14="http://schemas.microsoft.com/office/powerpoint/2010/main" Requires="p14">
-      <p:transition spd="slow" p14:dur="1600">
-        <p14:conveyor dir="l"/>
-      </p:transition>
-    </mc:Choice>
-    <mc:Fallback>
-      <p:transition spd="slow">
-        <p:fade/>
-      </p:transition>
-    </mc:Fallback>
-  </mc:AlternateContent>
-</p:sld>
-</file>
-
-<file path=ppt/slides/slide9.xml><?xml version="1.0" encoding="utf-8"?>
-<p:sld xmlns:a="http://schemas.openxmlformats.org/drawingml/2006/main" xmlns:r="http://schemas.openxmlformats.org/officeDocument/2006/relationships" xmlns:p="http://schemas.openxmlformats.org/presentationml/2006/main">
-  <p:cSld>
-    <p:bg>
-      <p:bgPr>
-        <a:gradFill rotWithShape="1">
-          <a:gsLst>
-            <a:gs pos="0">
-              <a:schemeClr val="bg1">
-                <a:tint val="90000"/>
-                <a:lumMod val="110000"/>
-              </a:schemeClr>
-            </a:gs>
-            <a:gs pos="100000">
-              <a:schemeClr val="bg1">
-                <a:shade val="64000"/>
-                <a:lumMod val="88000"/>
-              </a:schemeClr>
-            </a:gs>
-          </a:gsLst>
-          <a:lin ang="5400000" scaled="0"/>
-        </a:gradFill>
-        <a:effectLst/>
-      </p:bgPr>
-    </p:bg>
-    <p:spTree>
-      <p:nvGrpSpPr>
-        <p:cNvPr id="1" name=""/>
-        <p:cNvGrpSpPr/>
-        <p:nvPr/>
-      </p:nvGrpSpPr>
-      <p:grpSpPr>
-        <a:xfrm>
-          <a:off x="0" y="0"/>
-          <a:ext cx="0" cy="0"/>
-          <a:chOff x="0" y="0"/>
-          <a:chExt cx="0" cy="0"/>
-        </a:xfrm>
-      </p:grpSpPr>
-      <p:pic>
-        <p:nvPicPr>
-          <p:cNvPr id="41" name="Picture 2">
-            <a:extLst>
-              <a:ext uri="{FF2B5EF4-FFF2-40B4-BE49-F238E27FC236}">
-                <a16:creationId xmlns:a16="http://schemas.microsoft.com/office/drawing/2014/main" id="{9A0F0AC6-A89F-416B-9FA4-48E664065E73}"/>
-              </a:ext>
-              <a:ext uri="{C183D7F6-B498-43B3-948B-1728B52AA6E4}">
-                <adec:decorative xmlns:adec="http://schemas.microsoft.com/office/drawing/2017/decorative" val="1"/>
-              </a:ext>
-            </a:extLst>
-          </p:cNvPr>
-          <p:cNvPicPr>
-            <a:picLocks noGrp="1" noRot="1" noChangeAspect="1" noMove="1" noResize="1" noEditPoints="1" noAdjustHandles="1" noChangeArrowheads="1" noChangeShapeType="1" noCrop="1"/>
-          </p:cNvPicPr>
-          <p:nvPr>
-            <p:extLst>
-              <p:ext uri="{386F3935-93C4-4BCD-93E2-E3B085C9AB24}">
-                <p16:designElem xmlns:p16="http://schemas.microsoft.com/office/powerpoint/2015/main" val="1"/>
-              </p:ext>
-            </p:extLst>
-          </p:nvPr>
-        </p:nvPicPr>
-        <p:blipFill>
-          <a:blip r:embed="rId2">
-            <a:alphaModFix/>
-            <a:extLst>
-              <a:ext uri="{28A0092B-C50C-407E-A947-70E740481C1C}">
-                <a14:useLocalDpi xmlns:a14="http://schemas.microsoft.com/office/drawing/2010/main" val="0"/>
-              </a:ext>
-            </a:extLst>
-          </a:blip>
-          <a:srcRect/>
-          <a:stretch>
-            <a:fillRect/>
-          </a:stretch>
-        </p:blipFill>
-        <p:spPr bwMode="auto">
-          <a:xfrm>
-            <a:off x="0" y="-1"/>
-            <a:ext cx="12192003" cy="6858001"/>
-          </a:xfrm>
-          <a:prstGeom prst="rect">
-            <a:avLst/>
-          </a:prstGeom>
-          <a:noFill/>
-          <a:extLst>
-            <a:ext uri="{909E8E84-426E-40DD-AFC4-6F175D3DCCD1}">
-              <a14:hiddenFill xmlns:a14="http://schemas.microsoft.com/office/drawing/2010/main">
-                <a:solidFill>
-                  <a:srgbClr val="FFFFFF"/>
-                </a:solidFill>
-              </a14:hiddenFill>
-            </a:ext>
-          </a:extLst>
-        </p:spPr>
-      </p:pic>
-      <p:pic>
-        <p:nvPicPr>
-          <p:cNvPr id="43" name="Picture 42">
-            <a:extLst>
-              <a:ext uri="{FF2B5EF4-FFF2-40B4-BE49-F238E27FC236}">
-                <a16:creationId xmlns:a16="http://schemas.microsoft.com/office/drawing/2014/main" id="{C31AA009-40AD-4098-8AE7-680CA35C6EAA}"/>
-              </a:ext>
-              <a:ext uri="{C183D7F6-B498-43B3-948B-1728B52AA6E4}">
-                <adec:decorative xmlns:adec="http://schemas.microsoft.com/office/drawing/2017/decorative" val="1"/>
-              </a:ext>
-            </a:extLst>
-          </p:cNvPr>
-          <p:cNvPicPr>
-            <a:picLocks noGrp="1" noRot="1" noChangeAspect="1" noMove="1" noResize="1" noEditPoints="1" noAdjustHandles="1" noChangeArrowheads="1" noChangeShapeType="1" noCrop="1"/>
-          </p:cNvPicPr>
-          <p:nvPr>
-            <p:extLst>
-              <p:ext uri="{386F3935-93C4-4BCD-93E2-E3B085C9AB24}">
-                <p16:designElem xmlns:p16="http://schemas.microsoft.com/office/powerpoint/2015/main" val="1"/>
-              </p:ext>
-            </p:extLst>
-          </p:nvPr>
-        </p:nvPicPr>
-        <p:blipFill>
-          <a:blip r:embed="rId3">
-            <a:extLst>
-              <a:ext uri="{28A0092B-C50C-407E-A947-70E740481C1C}">
-                <a14:useLocalDpi xmlns:a14="http://schemas.microsoft.com/office/drawing/2010/main" val="0"/>
-              </a:ext>
-            </a:extLst>
-          </a:blip>
-          <a:stretch>
-            <a:fillRect/>
-          </a:stretch>
-        </p:blipFill>
-        <p:spPr>
-          <a:xfrm>
-            <a:off x="0" y="0"/>
-            <a:ext cx="12192000" cy="6858000"/>
-          </a:xfrm>
-          <a:prstGeom prst="rect">
-            <a:avLst/>
-          </a:prstGeom>
-        </p:spPr>
-      </p:pic>
-      <p:sp useBgFill="1">
-        <p:nvSpPr>
-          <p:cNvPr id="45" name="Rectangle 44">
-            <a:extLst>
-              <a:ext uri="{FF2B5EF4-FFF2-40B4-BE49-F238E27FC236}">
-                <a16:creationId xmlns:a16="http://schemas.microsoft.com/office/drawing/2014/main" id="{B63B6C0C-65BB-4F38-9C8A-0892266F8BC3}"/>
-              </a:ext>
-              <a:ext uri="{C183D7F6-B498-43B3-948B-1728B52AA6E4}">
-                <adec:decorative xmlns:adec="http://schemas.microsoft.com/office/drawing/2017/decorative" val="1"/>
-              </a:ext>
-            </a:extLst>
-          </p:cNvPr>
-          <p:cNvSpPr>
-            <a:spLocks noGrp="1" noRot="1" noChangeAspect="1" noMove="1" noResize="1" noEditPoints="1" noAdjustHandles="1" noChangeArrowheads="1" noChangeShapeType="1" noTextEdit="1"/>
-          </p:cNvSpPr>
-          <p:nvPr>
-            <p:extLst>
-              <p:ext uri="{386F3935-93C4-4BCD-93E2-E3B085C9AB24}">
-                <p16:designElem xmlns:p16="http://schemas.microsoft.com/office/powerpoint/2015/main" val="1"/>
-              </p:ext>
-            </p:extLst>
-          </p:nvPr>
-        </p:nvSpPr>
-        <p:spPr>
-          <a:xfrm>
-            <a:off x="0" y="0"/>
-            <a:ext cx="12192000" cy="6858000"/>
-          </a:xfrm>
-          <a:prstGeom prst="rect">
-            <a:avLst/>
-          </a:prstGeom>
-          <a:ln>
-            <a:noFill/>
-          </a:ln>
-        </p:spPr>
-        <p:style>
-          <a:lnRef idx="2">
-            <a:schemeClr val="accent1">
-              <a:shade val="50000"/>
-            </a:schemeClr>
-          </a:lnRef>
-          <a:fillRef idx="1">
-            <a:schemeClr val="accent1"/>
-          </a:fillRef>
-          <a:effectRef idx="0">
-            <a:schemeClr val="accent1"/>
-          </a:effectRef>
-          <a:fontRef idx="minor">
-            <a:schemeClr val="lt1"/>
-          </a:fontRef>
-        </p:style>
-        <p:txBody>
-          <a:bodyPr rtlCol="0" anchor="ctr"/>
-          <a:lstStyle/>
-          <a:p>
-            <a:pPr algn="ctr"/>
-            <a:endParaRPr lang="en-US" dirty="0"/>
-          </a:p>
-        </p:txBody>
-      </p:sp>
-      <p:pic>
-        <p:nvPicPr>
-          <p:cNvPr id="47" name="Picture 46">
-            <a:extLst>
-              <a:ext uri="{FF2B5EF4-FFF2-40B4-BE49-F238E27FC236}">
-                <a16:creationId xmlns:a16="http://schemas.microsoft.com/office/drawing/2014/main" id="{09D77137-01B7-45E4-AA14-CD9E779B443C}"/>
-              </a:ext>
-              <a:ext uri="{C183D7F6-B498-43B3-948B-1728B52AA6E4}">
-                <adec:decorative xmlns:adec="http://schemas.microsoft.com/office/drawing/2017/decorative" val="1"/>
-              </a:ext>
-            </a:extLst>
-          </p:cNvPr>
-          <p:cNvPicPr>
-            <a:picLocks noGrp="1" noRot="1" noChangeAspect="1" noMove="1" noResize="1" noEditPoints="1" noAdjustHandles="1" noChangeArrowheads="1" noChangeShapeType="1" noCrop="1"/>
-          </p:cNvPicPr>
-          <p:nvPr>
-            <p:extLst>
-              <p:ext uri="{386F3935-93C4-4BCD-93E2-E3B085C9AB24}">
-                <p16:designElem xmlns:p16="http://schemas.microsoft.com/office/powerpoint/2015/main" val="1"/>
-              </p:ext>
-            </p:extLst>
-          </p:nvPr>
-        </p:nvPicPr>
-        <p:blipFill>
-          <a:blip r:embed="rId3">
-            <a:extLst>
-              <a:ext uri="{28A0092B-C50C-407E-A947-70E740481C1C}">
-                <a14:useLocalDpi xmlns:a14="http://schemas.microsoft.com/office/drawing/2010/main" val="0"/>
-              </a:ext>
-            </a:extLst>
-          </a:blip>
-          <a:stretch>
-            <a:fillRect/>
-          </a:stretch>
-        </p:blipFill>
-        <p:spPr>
-          <a:xfrm>
-            <a:off x="0" y="0"/>
-            <a:ext cx="12192000" cy="6858000"/>
-          </a:xfrm>
-          <a:prstGeom prst="rect">
-            <a:avLst/>
-          </a:prstGeom>
-        </p:spPr>
-      </p:pic>
-      <p:sp>
-        <p:nvSpPr>
-          <p:cNvPr id="4" name="Title 3">
-            <a:extLst>
-              <a:ext uri="{FF2B5EF4-FFF2-40B4-BE49-F238E27FC236}">
-                <a16:creationId xmlns:a16="http://schemas.microsoft.com/office/drawing/2014/main" id="{8F7ED4F7-8328-074C-861F-3C7FCD774024}"/>
-              </a:ext>
-            </a:extLst>
-          </p:cNvPr>
-          <p:cNvSpPr>
-            <a:spLocks noGrp="1"/>
-          </p:cNvSpPr>
-          <p:nvPr>
-            <p:ph type="title"/>
-          </p:nvPr>
-        </p:nvSpPr>
-        <p:spPr>
-          <a:xfrm>
-            <a:off x="913774" y="1365957"/>
-            <a:ext cx="10364452" cy="4041422"/>
-          </a:xfrm>
-        </p:spPr>
-        <p:txBody>
-          <a:bodyPr vert="horz" lIns="91440" tIns="45720" rIns="91440" bIns="45720" rtlCol="0" anchor="ctr">
-            <a:normAutofit/>
-          </a:bodyPr>
-          <a:lstStyle/>
-          <a:p>
-            <a:r>
-              <a:rPr lang="en-US" sz="8000" dirty="0"/>
-              <a:t>The need for </a:t>
-            </a:r>
-            <a:r>
-              <a:rPr lang="en-US" sz="8000" dirty="0">
-                <a:hlinkClick r:id="rId4"/>
-              </a:rPr>
-              <a:t>memoization</a:t>
-            </a:r>
-            <a:r>
-              <a:rPr lang="en-US" sz="8000" dirty="0"/>
-              <a:t> (form of caching)</a:t>
-            </a:r>
-          </a:p>
-        </p:txBody>
-      </p:sp>
-    </p:spTree>
-    <p:extLst>
-      <p:ext uri="{BB962C8B-B14F-4D97-AF65-F5344CB8AC3E}">
-        <p14:creationId xmlns:p14="http://schemas.microsoft.com/office/powerpoint/2010/main" val="427496841"/>
-      </p:ext>
-    </p:extLst>
-  </p:cSld>
-  <p:clrMapOvr>
-    <a:masterClrMapping/>
-  </p:clrMapOvr>
-  <mc:AlternateContent xmlns:mc="http://schemas.openxmlformats.org/markup-compatibility/2006">
-    <mc:Choice xmlns:p14="http://schemas.microsoft.com/office/powerpoint/2010/main" Requires="p14">
-      <p:transition spd="slow" p14:dur="1600">
-        <p14:conveyor dir="l"/>
-      </p:transition>
-    </mc:Choice>
-    <mc:Fallback>
+    <mc:Fallback xmlns="">
       <p:transition spd="slow">
         <p:fade/>
       </p:transition>

</xml_diff>

<commit_message>
Fix wording in the presentation.
</commit_message>
<xml_diff>
--- a/trailer/Trailer.pptx
+++ b/trailer/Trailer.pptx
@@ -7444,7 +7444,7 @@
           <a:p>
             <a:r>
               <a:rPr lang="en-US" dirty="0"/>
-              <a:t>This channel </a:t>
+              <a:t>IT </a:t>
             </a:r>
             <a:r>
               <a:rPr lang="en-US" b="1" dirty="0"/>
@@ -7458,7 +7458,7 @@
           <a:p>
             <a:r>
               <a:rPr lang="en-US" dirty="0"/>
-              <a:t>This channel </a:t>
+              <a:t>IT </a:t>
             </a:r>
             <a:r>
               <a:rPr lang="en-US" b="1" dirty="0"/>
@@ -7472,7 +7472,7 @@
           <a:p>
             <a:r>
               <a:rPr lang="en-US" dirty="0"/>
-              <a:t>This channel hosts videos that I share with my students.</a:t>
+              <a:t>IT hosts videos that I share with my students.</a:t>
             </a:r>
           </a:p>
           <a:p>

</xml_diff>